<commit_message>
Revision of article ready for distribution to friendly critics. Updated and completed figures, all except for supplementary S2. Doc is version 5c, use compare to see changes.
</commit_message>
<xml_diff>
--- a/Notebooks/covid-19-caution/figures/Assembled_figs.pptx
+++ b/Notebooks/covid-19-caution/figures/Assembled_figs.pptx
@@ -4,9 +4,16 @@
   <p:sldMasterIdLst>
     <p:sldMasterId id="2147483672" r:id="rId1"/>
   </p:sldMasterIdLst>
+  <p:notesMasterIdLst>
+    <p:notesMasterId r:id="rId8"/>
+  </p:notesMasterIdLst>
   <p:sldIdLst>
     <p:sldId id="256" r:id="rId2"/>
     <p:sldId id="257" r:id="rId3"/>
+    <p:sldId id="261" r:id="rId4"/>
+    <p:sldId id="258" r:id="rId5"/>
+    <p:sldId id="259" r:id="rId6"/>
+    <p:sldId id="260" r:id="rId7"/>
   </p:sldIdLst>
   <p:sldSz cx="9144000" cy="6858000" type="screen4x3"/>
   <p:notesSz cx="6858000" cy="9144000"/>
@@ -105,7 +112,471 @@
       </a:defRPr>
     </a:lvl9pPr>
   </p:defaultTextStyle>
+  <p:extLst>
+    <p:ext uri="{EFAFB233-063F-42B5-8137-9DF3F51BA10A}">
+      <p15:sldGuideLst xmlns:p15="http://schemas.microsoft.com/office/powerpoint/2012/main"/>
+    </p:ext>
+  </p:extLst>
 </p:presentation>
+</file>
+
+<file path=ppt/notesMasters/notesMaster1.xml><?xml version="1.0" encoding="utf-8"?>
+<p:notesMaster xmlns:a="http://schemas.openxmlformats.org/drawingml/2006/main" xmlns:r="http://schemas.openxmlformats.org/officeDocument/2006/relationships" xmlns:p="http://schemas.openxmlformats.org/presentationml/2006/main">
+  <p:cSld>
+    <p:bg>
+      <p:bgRef idx="1001">
+        <a:schemeClr val="bg1"/>
+      </p:bgRef>
+    </p:bg>
+    <p:spTree>
+      <p:nvGrpSpPr>
+        <p:cNvPr id="1" name=""/>
+        <p:cNvGrpSpPr/>
+        <p:nvPr/>
+      </p:nvGrpSpPr>
+      <p:grpSpPr>
+        <a:xfrm>
+          <a:off x="0" y="0"/>
+          <a:ext cx="0" cy="0"/>
+          <a:chOff x="0" y="0"/>
+          <a:chExt cx="0" cy="0"/>
+        </a:xfrm>
+      </p:grpSpPr>
+      <p:sp>
+        <p:nvSpPr>
+          <p:cNvPr id="2" name="Header Placeholder 1"/>
+          <p:cNvSpPr>
+            <a:spLocks noGrp="1"/>
+          </p:cNvSpPr>
+          <p:nvPr>
+            <p:ph type="hdr" sz="quarter"/>
+          </p:nvPr>
+        </p:nvSpPr>
+        <p:spPr>
+          <a:xfrm>
+            <a:off x="0" y="0"/>
+            <a:ext cx="2971800" cy="458788"/>
+          </a:xfrm>
+          <a:prstGeom prst="rect">
+            <a:avLst/>
+          </a:prstGeom>
+        </p:spPr>
+        <p:txBody>
+          <a:bodyPr vert="horz" lIns="91440" tIns="45720" rIns="91440" bIns="45720" rtlCol="0"/>
+          <a:lstStyle>
+            <a:lvl1pPr algn="l">
+              <a:defRPr sz="1200"/>
+            </a:lvl1pPr>
+          </a:lstStyle>
+          <a:p>
+            <a:endParaRPr lang="en-AU"/>
+          </a:p>
+        </p:txBody>
+      </p:sp>
+      <p:sp>
+        <p:nvSpPr>
+          <p:cNvPr id="3" name="Date Placeholder 2"/>
+          <p:cNvSpPr>
+            <a:spLocks noGrp="1"/>
+          </p:cNvSpPr>
+          <p:nvPr>
+            <p:ph type="dt" idx="1"/>
+          </p:nvPr>
+        </p:nvSpPr>
+        <p:spPr>
+          <a:xfrm>
+            <a:off x="3884613" y="0"/>
+            <a:ext cx="2971800" cy="458788"/>
+          </a:xfrm>
+          <a:prstGeom prst="rect">
+            <a:avLst/>
+          </a:prstGeom>
+        </p:spPr>
+        <p:txBody>
+          <a:bodyPr vert="horz" lIns="91440" tIns="45720" rIns="91440" bIns="45720" rtlCol="0"/>
+          <a:lstStyle>
+            <a:lvl1pPr algn="r">
+              <a:defRPr sz="1200"/>
+            </a:lvl1pPr>
+          </a:lstStyle>
+          <a:p>
+            <a:fld id="{DFFD465C-9FD1-214C-B301-A94B1CF6E8E8}" type="datetimeFigureOut">
+              <a:rPr lang="en-AU" smtClean="0"/>
+              <a:t>25/8/20</a:t>
+            </a:fld>
+            <a:endParaRPr lang="en-AU"/>
+          </a:p>
+        </p:txBody>
+      </p:sp>
+      <p:sp>
+        <p:nvSpPr>
+          <p:cNvPr id="4" name="Slide Image Placeholder 3"/>
+          <p:cNvSpPr>
+            <a:spLocks noGrp="1" noRot="1" noChangeAspect="1"/>
+          </p:cNvSpPr>
+          <p:nvPr>
+            <p:ph type="sldImg" idx="2"/>
+          </p:nvPr>
+        </p:nvSpPr>
+        <p:spPr>
+          <a:xfrm>
+            <a:off x="1371600" y="1143000"/>
+            <a:ext cx="4114800" cy="3086100"/>
+          </a:xfrm>
+          <a:prstGeom prst="rect">
+            <a:avLst/>
+          </a:prstGeom>
+          <a:noFill/>
+          <a:ln w="12700">
+            <a:solidFill>
+              <a:prstClr val="black"/>
+            </a:solidFill>
+          </a:ln>
+        </p:spPr>
+        <p:txBody>
+          <a:bodyPr vert="horz" lIns="91440" tIns="45720" rIns="91440" bIns="45720" rtlCol="0" anchor="ctr"/>
+          <a:lstStyle/>
+          <a:p>
+            <a:endParaRPr lang="en-AU"/>
+          </a:p>
+        </p:txBody>
+      </p:sp>
+      <p:sp>
+        <p:nvSpPr>
+          <p:cNvPr id="5" name="Notes Placeholder 4"/>
+          <p:cNvSpPr>
+            <a:spLocks noGrp="1"/>
+          </p:cNvSpPr>
+          <p:nvPr>
+            <p:ph type="body" sz="quarter" idx="3"/>
+          </p:nvPr>
+        </p:nvSpPr>
+        <p:spPr>
+          <a:xfrm>
+            <a:off x="685800" y="4400550"/>
+            <a:ext cx="5486400" cy="3600450"/>
+          </a:xfrm>
+          <a:prstGeom prst="rect">
+            <a:avLst/>
+          </a:prstGeom>
+        </p:spPr>
+        <p:txBody>
+          <a:bodyPr vert="horz" lIns="91440" tIns="45720" rIns="91440" bIns="45720" rtlCol="0"/>
+          <a:lstStyle/>
+          <a:p>
+            <a:pPr lvl="0"/>
+            <a:r>
+              <a:rPr lang="en-GB"/>
+              <a:t>Click to edit Master text styles</a:t>
+            </a:r>
+          </a:p>
+          <a:p>
+            <a:pPr lvl="1"/>
+            <a:r>
+              <a:rPr lang="en-GB"/>
+              <a:t>Second level</a:t>
+            </a:r>
+          </a:p>
+          <a:p>
+            <a:pPr lvl="2"/>
+            <a:r>
+              <a:rPr lang="en-GB"/>
+              <a:t>Third level</a:t>
+            </a:r>
+          </a:p>
+          <a:p>
+            <a:pPr lvl="3"/>
+            <a:r>
+              <a:rPr lang="en-GB"/>
+              <a:t>Fourth level</a:t>
+            </a:r>
+          </a:p>
+          <a:p>
+            <a:pPr lvl="4"/>
+            <a:r>
+              <a:rPr lang="en-GB"/>
+              <a:t>Fifth level</a:t>
+            </a:r>
+            <a:endParaRPr lang="en-AU"/>
+          </a:p>
+        </p:txBody>
+      </p:sp>
+      <p:sp>
+        <p:nvSpPr>
+          <p:cNvPr id="6" name="Footer Placeholder 5"/>
+          <p:cNvSpPr>
+            <a:spLocks noGrp="1"/>
+          </p:cNvSpPr>
+          <p:nvPr>
+            <p:ph type="ftr" sz="quarter" idx="4"/>
+          </p:nvPr>
+        </p:nvSpPr>
+        <p:spPr>
+          <a:xfrm>
+            <a:off x="0" y="8685213"/>
+            <a:ext cx="2971800" cy="458787"/>
+          </a:xfrm>
+          <a:prstGeom prst="rect">
+            <a:avLst/>
+          </a:prstGeom>
+        </p:spPr>
+        <p:txBody>
+          <a:bodyPr vert="horz" lIns="91440" tIns="45720" rIns="91440" bIns="45720" rtlCol="0" anchor="b"/>
+          <a:lstStyle>
+            <a:lvl1pPr algn="l">
+              <a:defRPr sz="1200"/>
+            </a:lvl1pPr>
+          </a:lstStyle>
+          <a:p>
+            <a:endParaRPr lang="en-AU"/>
+          </a:p>
+        </p:txBody>
+      </p:sp>
+      <p:sp>
+        <p:nvSpPr>
+          <p:cNvPr id="7" name="Slide Number Placeholder 6"/>
+          <p:cNvSpPr>
+            <a:spLocks noGrp="1"/>
+          </p:cNvSpPr>
+          <p:nvPr>
+            <p:ph type="sldNum" sz="quarter" idx="5"/>
+          </p:nvPr>
+        </p:nvSpPr>
+        <p:spPr>
+          <a:xfrm>
+            <a:off x="3884613" y="8685213"/>
+            <a:ext cx="2971800" cy="458787"/>
+          </a:xfrm>
+          <a:prstGeom prst="rect">
+            <a:avLst/>
+          </a:prstGeom>
+        </p:spPr>
+        <p:txBody>
+          <a:bodyPr vert="horz" lIns="91440" tIns="45720" rIns="91440" bIns="45720" rtlCol="0" anchor="b"/>
+          <a:lstStyle>
+            <a:lvl1pPr algn="r">
+              <a:defRPr sz="1200"/>
+            </a:lvl1pPr>
+          </a:lstStyle>
+          <a:p>
+            <a:fld id="{9BD02877-8FC9-544F-B217-965B98AF8DEF}" type="slidenum">
+              <a:rPr lang="en-AU" smtClean="0"/>
+              <a:t>‹#›</a:t>
+            </a:fld>
+            <a:endParaRPr lang="en-AU"/>
+          </a:p>
+        </p:txBody>
+      </p:sp>
+    </p:spTree>
+    <p:extLst>
+      <p:ext uri="{BB962C8B-B14F-4D97-AF65-F5344CB8AC3E}">
+        <p14:creationId xmlns:p14="http://schemas.microsoft.com/office/powerpoint/2010/main" val="882304155"/>
+      </p:ext>
+    </p:extLst>
+  </p:cSld>
+  <p:clrMap bg1="lt1" tx1="dk1" bg2="lt2" tx2="dk2" accent1="accent1" accent2="accent2" accent3="accent3" accent4="accent4" accent5="accent5" accent6="accent6" hlink="hlink" folHlink="folHlink"/>
+  <p:notesStyle>
+    <a:lvl1pPr marL="0" algn="l" defTabSz="914400" rtl="0" eaLnBrk="1" latinLnBrk="0" hangingPunct="1">
+      <a:defRPr sz="1200" kern="1200">
+        <a:solidFill>
+          <a:schemeClr val="tx1"/>
+        </a:solidFill>
+        <a:latin typeface="+mn-lt"/>
+        <a:ea typeface="+mn-ea"/>
+        <a:cs typeface="+mn-cs"/>
+      </a:defRPr>
+    </a:lvl1pPr>
+    <a:lvl2pPr marL="457200" algn="l" defTabSz="914400" rtl="0" eaLnBrk="1" latinLnBrk="0" hangingPunct="1">
+      <a:defRPr sz="1200" kern="1200">
+        <a:solidFill>
+          <a:schemeClr val="tx1"/>
+        </a:solidFill>
+        <a:latin typeface="+mn-lt"/>
+        <a:ea typeface="+mn-ea"/>
+        <a:cs typeface="+mn-cs"/>
+      </a:defRPr>
+    </a:lvl2pPr>
+    <a:lvl3pPr marL="914400" algn="l" defTabSz="914400" rtl="0" eaLnBrk="1" latinLnBrk="0" hangingPunct="1">
+      <a:defRPr sz="1200" kern="1200">
+        <a:solidFill>
+          <a:schemeClr val="tx1"/>
+        </a:solidFill>
+        <a:latin typeface="+mn-lt"/>
+        <a:ea typeface="+mn-ea"/>
+        <a:cs typeface="+mn-cs"/>
+      </a:defRPr>
+    </a:lvl3pPr>
+    <a:lvl4pPr marL="1371600" algn="l" defTabSz="914400" rtl="0" eaLnBrk="1" latinLnBrk="0" hangingPunct="1">
+      <a:defRPr sz="1200" kern="1200">
+        <a:solidFill>
+          <a:schemeClr val="tx1"/>
+        </a:solidFill>
+        <a:latin typeface="+mn-lt"/>
+        <a:ea typeface="+mn-ea"/>
+        <a:cs typeface="+mn-cs"/>
+      </a:defRPr>
+    </a:lvl4pPr>
+    <a:lvl5pPr marL="1828800" algn="l" defTabSz="914400" rtl="0" eaLnBrk="1" latinLnBrk="0" hangingPunct="1">
+      <a:defRPr sz="1200" kern="1200">
+        <a:solidFill>
+          <a:schemeClr val="tx1"/>
+        </a:solidFill>
+        <a:latin typeface="+mn-lt"/>
+        <a:ea typeface="+mn-ea"/>
+        <a:cs typeface="+mn-cs"/>
+      </a:defRPr>
+    </a:lvl5pPr>
+    <a:lvl6pPr marL="2286000" algn="l" defTabSz="914400" rtl="0" eaLnBrk="1" latinLnBrk="0" hangingPunct="1">
+      <a:defRPr sz="1200" kern="1200">
+        <a:solidFill>
+          <a:schemeClr val="tx1"/>
+        </a:solidFill>
+        <a:latin typeface="+mn-lt"/>
+        <a:ea typeface="+mn-ea"/>
+        <a:cs typeface="+mn-cs"/>
+      </a:defRPr>
+    </a:lvl6pPr>
+    <a:lvl7pPr marL="2743200" algn="l" defTabSz="914400" rtl="0" eaLnBrk="1" latinLnBrk="0" hangingPunct="1">
+      <a:defRPr sz="1200" kern="1200">
+        <a:solidFill>
+          <a:schemeClr val="tx1"/>
+        </a:solidFill>
+        <a:latin typeface="+mn-lt"/>
+        <a:ea typeface="+mn-ea"/>
+        <a:cs typeface="+mn-cs"/>
+      </a:defRPr>
+    </a:lvl7pPr>
+    <a:lvl8pPr marL="3200400" algn="l" defTabSz="914400" rtl="0" eaLnBrk="1" latinLnBrk="0" hangingPunct="1">
+      <a:defRPr sz="1200" kern="1200">
+        <a:solidFill>
+          <a:schemeClr val="tx1"/>
+        </a:solidFill>
+        <a:latin typeface="+mn-lt"/>
+        <a:ea typeface="+mn-ea"/>
+        <a:cs typeface="+mn-cs"/>
+      </a:defRPr>
+    </a:lvl8pPr>
+    <a:lvl9pPr marL="3657600" algn="l" defTabSz="914400" rtl="0" eaLnBrk="1" latinLnBrk="0" hangingPunct="1">
+      <a:defRPr sz="1200" kern="1200">
+        <a:solidFill>
+          <a:schemeClr val="tx1"/>
+        </a:solidFill>
+        <a:latin typeface="+mn-lt"/>
+        <a:ea typeface="+mn-ea"/>
+        <a:cs typeface="+mn-cs"/>
+      </a:defRPr>
+    </a:lvl9pPr>
+  </p:notesStyle>
+</p:notesMaster>
+</file>
+
+<file path=ppt/notesSlides/notesSlide1.xml><?xml version="1.0" encoding="utf-8"?>
+<p:notes xmlns:a="http://schemas.openxmlformats.org/drawingml/2006/main" xmlns:r="http://schemas.openxmlformats.org/officeDocument/2006/relationships" xmlns:p="http://schemas.openxmlformats.org/presentationml/2006/main">
+  <p:cSld>
+    <p:spTree>
+      <p:nvGrpSpPr>
+        <p:cNvPr id="1" name=""/>
+        <p:cNvGrpSpPr/>
+        <p:nvPr/>
+      </p:nvGrpSpPr>
+      <p:grpSpPr>
+        <a:xfrm>
+          <a:off x="0" y="0"/>
+          <a:ext cx="0" cy="0"/>
+          <a:chOff x="0" y="0"/>
+          <a:chExt cx="0" cy="0"/>
+        </a:xfrm>
+      </p:grpSpPr>
+      <p:sp>
+        <p:nvSpPr>
+          <p:cNvPr id="2" name="Slide Image Placeholder 1"/>
+          <p:cNvSpPr>
+            <a:spLocks noGrp="1" noRot="1" noChangeAspect="1"/>
+          </p:cNvSpPr>
+          <p:nvPr>
+            <p:ph type="sldImg"/>
+          </p:nvPr>
+        </p:nvSpPr>
+        <p:spPr/>
+      </p:sp>
+      <p:sp>
+        <p:nvSpPr>
+          <p:cNvPr id="3" name="Notes Placeholder 2"/>
+          <p:cNvSpPr>
+            <a:spLocks noGrp="1"/>
+          </p:cNvSpPr>
+          <p:nvPr>
+            <p:ph type="body" idx="1"/>
+          </p:nvPr>
+        </p:nvSpPr>
+        <p:spPr/>
+        <p:txBody>
+          <a:bodyPr/>
+          <a:lstStyle/>
+          <a:p>
+            <a:r>
+              <a:rPr lang="en-GB" dirty="0"/>
+              <a:t>{'beta_1': 0.44, 'alpha': 0.25, 'mu': 0.026, 'c_0': 0.38, 'c_1': 0.009, 'c_2': 348.0, 'logI_0': -6.5, '</a:t>
+            </a:r>
+            <a:r>
+              <a:rPr lang="en-GB" dirty="0" err="1"/>
+              <a:t>k_u</a:t>
+            </a:r>
+            <a:r>
+              <a:rPr lang="en-GB" dirty="0"/>
+              <a:t>': 0.241, 'k_1': 0.009, '</a:t>
+            </a:r>
+            <a:r>
+              <a:rPr lang="en-GB" dirty="0" err="1"/>
+              <a:t>k_w</a:t>
+            </a:r>
+            <a:r>
+              <a:rPr lang="en-GB" dirty="0"/>
+              <a:t>': 0.021, 'kappa': 0.367}    USA</a:t>
+            </a:r>
+          </a:p>
+          <a:p>
+            <a:endParaRPr lang="en-GB" dirty="0"/>
+          </a:p>
+          <a:p>
+            <a:endParaRPr lang="en-AU" dirty="0"/>
+          </a:p>
+        </p:txBody>
+      </p:sp>
+      <p:sp>
+        <p:nvSpPr>
+          <p:cNvPr id="4" name="Slide Number Placeholder 3"/>
+          <p:cNvSpPr>
+            <a:spLocks noGrp="1"/>
+          </p:cNvSpPr>
+          <p:nvPr>
+            <p:ph type="sldNum" sz="quarter" idx="5"/>
+          </p:nvPr>
+        </p:nvSpPr>
+        <p:spPr/>
+        <p:txBody>
+          <a:bodyPr/>
+          <a:lstStyle/>
+          <a:p>
+            <a:fld id="{9BD02877-8FC9-544F-B217-965B98AF8DEF}" type="slidenum">
+              <a:rPr lang="en-AU" smtClean="0"/>
+              <a:t>3</a:t>
+            </a:fld>
+            <a:endParaRPr lang="en-AU"/>
+          </a:p>
+        </p:txBody>
+      </p:sp>
+    </p:spTree>
+    <p:extLst>
+      <p:ext uri="{BB962C8B-B14F-4D97-AF65-F5344CB8AC3E}">
+        <p14:creationId xmlns:p14="http://schemas.microsoft.com/office/powerpoint/2010/main" val="3333930563"/>
+      </p:ext>
+    </p:extLst>
+  </p:cSld>
+  <p:clrMapOvr>
+    <a:masterClrMapping/>
+  </p:clrMapOvr>
+</p:notes>
 </file>
 
 <file path=ppt/slideLayouts/slideLayout1.xml><?xml version="1.0" encoding="utf-8"?>
@@ -239,7 +710,7 @@
           <a:p>
             <a:fld id="{424F0358-0D26-BB46-82E3-4755F78A335E}" type="datetimeFigureOut">
               <a:rPr lang="en-AU" smtClean="0"/>
-              <a:t>24/8/20</a:t>
+              <a:t>25/8/20</a:t>
             </a:fld>
             <a:endParaRPr lang="en-AU"/>
           </a:p>
@@ -409,7 +880,7 @@
           <a:p>
             <a:fld id="{424F0358-0D26-BB46-82E3-4755F78A335E}" type="datetimeFigureOut">
               <a:rPr lang="en-AU" smtClean="0"/>
-              <a:t>24/8/20</a:t>
+              <a:t>25/8/20</a:t>
             </a:fld>
             <a:endParaRPr lang="en-AU"/>
           </a:p>
@@ -589,7 +1060,7 @@
           <a:p>
             <a:fld id="{424F0358-0D26-BB46-82E3-4755F78A335E}" type="datetimeFigureOut">
               <a:rPr lang="en-AU" smtClean="0"/>
-              <a:t>24/8/20</a:t>
+              <a:t>25/8/20</a:t>
             </a:fld>
             <a:endParaRPr lang="en-AU"/>
           </a:p>
@@ -759,7 +1230,7 @@
           <a:p>
             <a:fld id="{424F0358-0D26-BB46-82E3-4755F78A335E}" type="datetimeFigureOut">
               <a:rPr lang="en-AU" smtClean="0"/>
-              <a:t>24/8/20</a:t>
+              <a:t>25/8/20</a:t>
             </a:fld>
             <a:endParaRPr lang="en-AU"/>
           </a:p>
@@ -1003,7 +1474,7 @@
           <a:p>
             <a:fld id="{424F0358-0D26-BB46-82E3-4755F78A335E}" type="datetimeFigureOut">
               <a:rPr lang="en-AU" smtClean="0"/>
-              <a:t>24/8/20</a:t>
+              <a:t>25/8/20</a:t>
             </a:fld>
             <a:endParaRPr lang="en-AU"/>
           </a:p>
@@ -1235,7 +1706,7 @@
           <a:p>
             <a:fld id="{424F0358-0D26-BB46-82E3-4755F78A335E}" type="datetimeFigureOut">
               <a:rPr lang="en-AU" smtClean="0"/>
-              <a:t>24/8/20</a:t>
+              <a:t>25/8/20</a:t>
             </a:fld>
             <a:endParaRPr lang="en-AU"/>
           </a:p>
@@ -1602,7 +2073,7 @@
           <a:p>
             <a:fld id="{424F0358-0D26-BB46-82E3-4755F78A335E}" type="datetimeFigureOut">
               <a:rPr lang="en-AU" smtClean="0"/>
-              <a:t>24/8/20</a:t>
+              <a:t>25/8/20</a:t>
             </a:fld>
             <a:endParaRPr lang="en-AU"/>
           </a:p>
@@ -1720,7 +2191,7 @@
           <a:p>
             <a:fld id="{424F0358-0D26-BB46-82E3-4755F78A335E}" type="datetimeFigureOut">
               <a:rPr lang="en-AU" smtClean="0"/>
-              <a:t>24/8/20</a:t>
+              <a:t>25/8/20</a:t>
             </a:fld>
             <a:endParaRPr lang="en-AU"/>
           </a:p>
@@ -1815,7 +2286,7 @@
           <a:p>
             <a:fld id="{424F0358-0D26-BB46-82E3-4755F78A335E}" type="datetimeFigureOut">
               <a:rPr lang="en-AU" smtClean="0"/>
-              <a:t>24/8/20</a:t>
+              <a:t>25/8/20</a:t>
             </a:fld>
             <a:endParaRPr lang="en-AU"/>
           </a:p>
@@ -2092,7 +2563,7 @@
           <a:p>
             <a:fld id="{424F0358-0D26-BB46-82E3-4755F78A335E}" type="datetimeFigureOut">
               <a:rPr lang="en-AU" smtClean="0"/>
-              <a:t>24/8/20</a:t>
+              <a:t>25/8/20</a:t>
             </a:fld>
             <a:endParaRPr lang="en-AU"/>
           </a:p>
@@ -2349,7 +2820,7 @@
           <a:p>
             <a:fld id="{424F0358-0D26-BB46-82E3-4755F78A335E}" type="datetimeFigureOut">
               <a:rPr lang="en-AU" smtClean="0"/>
-              <a:t>24/8/20</a:t>
+              <a:t>25/8/20</a:t>
             </a:fld>
             <a:endParaRPr lang="en-AU"/>
           </a:p>
@@ -2562,7 +3033,7 @@
           <a:p>
             <a:fld id="{424F0358-0D26-BB46-82E3-4755F78A335E}" type="datetimeFigureOut">
               <a:rPr lang="en-AU" smtClean="0"/>
-              <a:t>24/8/20</a:t>
+              <a:t>25/8/20</a:t>
             </a:fld>
             <a:endParaRPr lang="en-AU"/>
           </a:p>
@@ -2969,10 +3440,10 @@
       </p:grpSpPr>
       <p:grpSp>
         <p:nvGrpSpPr>
-          <p:cNvPr id="17" name="Group 16">
+          <p:cNvPr id="4" name="Group 3">
             <a:extLst>
               <a:ext uri="{FF2B5EF4-FFF2-40B4-BE49-F238E27FC236}">
-                <a16:creationId xmlns:a16="http://schemas.microsoft.com/office/drawing/2014/main" id="{5CFD6CA9-515A-4946-9BD3-42ED2DD18776}"/>
+                <a16:creationId xmlns:a16="http://schemas.microsoft.com/office/drawing/2014/main" id="{04CE82E0-68FB-2640-841B-AB57683AFC8F}"/>
               </a:ext>
             </a:extLst>
           </p:cNvPr>
@@ -2982,152 +3453,131 @@
         <p:grpSpPr>
           <a:xfrm>
             <a:off x="680665" y="388916"/>
-            <a:ext cx="8071272" cy="5415336"/>
+            <a:ext cx="8068339" cy="5425816"/>
             <a:chOff x="680665" y="388916"/>
-            <a:chExt cx="8071272" cy="5415336"/>
+            <a:chExt cx="8068339" cy="5425816"/>
           </a:xfrm>
         </p:grpSpPr>
-        <p:grpSp>
-          <p:nvGrpSpPr>
-            <p:cNvPr id="14" name="Group 13">
+        <p:pic>
+          <p:nvPicPr>
+            <p:cNvPr id="9" name="Picture 8">
               <a:extLst>
                 <a:ext uri="{FF2B5EF4-FFF2-40B4-BE49-F238E27FC236}">
-                  <a16:creationId xmlns:a16="http://schemas.microsoft.com/office/drawing/2014/main" id="{A7087BBA-02EF-6147-9461-01DB941A6546}"/>
+                  <a16:creationId xmlns:a16="http://schemas.microsoft.com/office/drawing/2014/main" id="{C171D1EF-8D13-3E49-AA1E-EA543D7DE1D0}"/>
                 </a:ext>
               </a:extLst>
             </p:cNvPr>
-            <p:cNvGrpSpPr/>
+            <p:cNvPicPr>
+              <a:picLocks noChangeAspect="1"/>
+            </p:cNvPicPr>
             <p:nvPr/>
-          </p:nvGrpSpPr>
-          <p:grpSpPr>
+          </p:nvPicPr>
+          <p:blipFill>
+            <a:blip r:embed="rId2"/>
+            <a:stretch>
+              <a:fillRect/>
+            </a:stretch>
+          </p:blipFill>
+          <p:spPr>
+            <a:xfrm>
+              <a:off x="4762039" y="537490"/>
+              <a:ext cx="3986965" cy="2766910"/>
+            </a:xfrm>
+            <a:prstGeom prst="rect">
+              <a:avLst/>
+            </a:prstGeom>
+          </p:spPr>
+        </p:pic>
+        <p:pic>
+          <p:nvPicPr>
+            <p:cNvPr id="3" name="Picture 2">
+              <a:extLst>
+                <a:ext uri="{FF2B5EF4-FFF2-40B4-BE49-F238E27FC236}">
+                  <a16:creationId xmlns:a16="http://schemas.microsoft.com/office/drawing/2014/main" id="{05762639-BCCB-2749-8E31-D6C53E91575F}"/>
+                </a:ext>
+              </a:extLst>
+            </p:cNvPr>
+            <p:cNvPicPr>
+              <a:picLocks noChangeAspect="1"/>
+            </p:cNvPicPr>
+            <p:nvPr/>
+          </p:nvPicPr>
+          <p:blipFill>
+            <a:blip r:embed="rId3"/>
+            <a:stretch>
+              <a:fillRect/>
+            </a:stretch>
+          </p:blipFill>
+          <p:spPr>
+            <a:xfrm>
+              <a:off x="4723714" y="3022414"/>
+              <a:ext cx="4025289" cy="2792318"/>
+            </a:xfrm>
+            <a:prstGeom prst="rect">
+              <a:avLst/>
+            </a:prstGeom>
+          </p:spPr>
+        </p:pic>
+        <p:pic>
+          <p:nvPicPr>
+            <p:cNvPr id="11" name="Picture 10">
+              <a:extLst>
+                <a:ext uri="{FF2B5EF4-FFF2-40B4-BE49-F238E27FC236}">
+                  <a16:creationId xmlns:a16="http://schemas.microsoft.com/office/drawing/2014/main" id="{B42AF750-04A7-E345-B1D0-C8D6BD3664B8}"/>
+                </a:ext>
+              </a:extLst>
+            </p:cNvPr>
+            <p:cNvPicPr>
+              <a:picLocks noChangeAspect="1"/>
+            </p:cNvPicPr>
+            <p:nvPr/>
+          </p:nvPicPr>
+          <p:blipFill>
+            <a:blip r:embed="rId4"/>
+            <a:stretch>
+              <a:fillRect/>
+            </a:stretch>
+          </p:blipFill>
+          <p:spPr>
             <a:xfrm>
               <a:off x="680665" y="537490"/>
-              <a:ext cx="8071272" cy="5266762"/>
-              <a:chOff x="680665" y="537490"/>
-              <a:chExt cx="8071272" cy="5266762"/>
+              <a:ext cx="4081374" cy="2766910"/>
             </a:xfrm>
-          </p:grpSpPr>
-          <p:pic>
-            <p:nvPicPr>
-              <p:cNvPr id="9" name="Picture 8">
-                <a:extLst>
-                  <a:ext uri="{FF2B5EF4-FFF2-40B4-BE49-F238E27FC236}">
-                    <a16:creationId xmlns:a16="http://schemas.microsoft.com/office/drawing/2014/main" id="{C171D1EF-8D13-3E49-AA1E-EA543D7DE1D0}"/>
-                  </a:ext>
-                </a:extLst>
-              </p:cNvPr>
-              <p:cNvPicPr>
-                <a:picLocks noChangeAspect="1"/>
-              </p:cNvPicPr>
-              <p:nvPr/>
-            </p:nvPicPr>
-            <p:blipFill>
-              <a:blip r:embed="rId2"/>
-              <a:stretch>
-                <a:fillRect/>
-              </a:stretch>
-            </p:blipFill>
-            <p:spPr>
-              <a:xfrm>
-                <a:off x="4762039" y="537490"/>
-                <a:ext cx="3986965" cy="2766910"/>
-              </a:xfrm>
-              <a:prstGeom prst="rect">
-                <a:avLst/>
-              </a:prstGeom>
-            </p:spPr>
-          </p:pic>
-          <p:pic>
-            <p:nvPicPr>
-              <p:cNvPr id="11" name="Picture 10">
-                <a:extLst>
-                  <a:ext uri="{FF2B5EF4-FFF2-40B4-BE49-F238E27FC236}">
-                    <a16:creationId xmlns:a16="http://schemas.microsoft.com/office/drawing/2014/main" id="{B42AF750-04A7-E345-B1D0-C8D6BD3664B8}"/>
-                  </a:ext>
-                </a:extLst>
-              </p:cNvPr>
-              <p:cNvPicPr>
-                <a:picLocks noChangeAspect="1"/>
-              </p:cNvPicPr>
-              <p:nvPr/>
-            </p:nvPicPr>
-            <p:blipFill>
-              <a:blip r:embed="rId3"/>
-              <a:stretch>
-                <a:fillRect/>
-              </a:stretch>
-            </p:blipFill>
-            <p:spPr>
-              <a:xfrm>
-                <a:off x="680665" y="537490"/>
-                <a:ext cx="4081374" cy="2766910"/>
-              </a:xfrm>
-              <a:prstGeom prst="rect">
-                <a:avLst/>
-              </a:prstGeom>
-            </p:spPr>
-          </p:pic>
-          <p:pic>
-            <p:nvPicPr>
-              <p:cNvPr id="5" name="Picture 4">
-                <a:extLst>
-                  <a:ext uri="{FF2B5EF4-FFF2-40B4-BE49-F238E27FC236}">
-                    <a16:creationId xmlns:a16="http://schemas.microsoft.com/office/drawing/2014/main" id="{1338C4D5-9BF3-F446-BECE-EAB0CC2B1998}"/>
-                  </a:ext>
-                </a:extLst>
-              </p:cNvPr>
-              <p:cNvPicPr>
-                <a:picLocks noChangeAspect="1"/>
-              </p:cNvPicPr>
-              <p:nvPr/>
-            </p:nvPicPr>
-            <p:blipFill>
-              <a:blip r:embed="rId4"/>
-              <a:stretch>
-                <a:fillRect/>
-              </a:stretch>
-            </p:blipFill>
-            <p:spPr>
-              <a:xfrm>
-                <a:off x="4721399" y="3030080"/>
-                <a:ext cx="4030538" cy="2774172"/>
-              </a:xfrm>
-              <a:prstGeom prst="rect">
-                <a:avLst/>
-              </a:prstGeom>
-            </p:spPr>
-          </p:pic>
-          <p:pic>
-            <p:nvPicPr>
-              <p:cNvPr id="13" name="Picture 12">
-                <a:extLst>
-                  <a:ext uri="{FF2B5EF4-FFF2-40B4-BE49-F238E27FC236}">
-                    <a16:creationId xmlns:a16="http://schemas.microsoft.com/office/drawing/2014/main" id="{49EC57C7-1088-384D-8322-F75CDFA856B8}"/>
-                  </a:ext>
-                </a:extLst>
-              </p:cNvPr>
-              <p:cNvPicPr>
-                <a:picLocks noChangeAspect="1"/>
-              </p:cNvPicPr>
-              <p:nvPr/>
-            </p:nvPicPr>
-            <p:blipFill>
-              <a:blip r:embed="rId5"/>
-              <a:stretch>
-                <a:fillRect/>
-              </a:stretch>
-            </p:blipFill>
-            <p:spPr>
-              <a:xfrm>
-                <a:off x="924560" y="2961551"/>
-                <a:ext cx="3834546" cy="2836117"/>
-              </a:xfrm>
-              <a:prstGeom prst="rect">
-                <a:avLst/>
-              </a:prstGeom>
-            </p:spPr>
-          </p:pic>
-        </p:grpSp>
+            <a:prstGeom prst="rect">
+              <a:avLst/>
+            </a:prstGeom>
+          </p:spPr>
+        </p:pic>
+        <p:pic>
+          <p:nvPicPr>
+            <p:cNvPr id="13" name="Picture 12">
+              <a:extLst>
+                <a:ext uri="{FF2B5EF4-FFF2-40B4-BE49-F238E27FC236}">
+                  <a16:creationId xmlns:a16="http://schemas.microsoft.com/office/drawing/2014/main" id="{49EC57C7-1088-384D-8322-F75CDFA856B8}"/>
+                </a:ext>
+              </a:extLst>
+            </p:cNvPr>
+            <p:cNvPicPr>
+              <a:picLocks noChangeAspect="1"/>
+            </p:cNvPicPr>
+            <p:nvPr/>
+          </p:nvPicPr>
+          <p:blipFill>
+            <a:blip r:embed="rId5"/>
+            <a:stretch>
+              <a:fillRect/>
+            </a:stretch>
+          </p:blipFill>
+          <p:spPr>
+            <a:xfrm>
+              <a:off x="924560" y="2961551"/>
+              <a:ext cx="3834546" cy="2836117"/>
+            </a:xfrm>
+            <a:prstGeom prst="rect">
+              <a:avLst/>
+            </a:prstGeom>
+          </p:spPr>
+        </p:pic>
         <p:sp>
           <p:nvSpPr>
             <p:cNvPr id="15" name="TextBox 14">
@@ -3177,7 +3627,7 @@
           </p:nvSpPr>
           <p:spPr>
             <a:xfrm>
-              <a:off x="737308" y="2811150"/>
+              <a:off x="737308" y="2804572"/>
               <a:ext cx="345385" cy="369332"/>
             </a:xfrm>
             <a:prstGeom prst="rect">
@@ -3247,7 +3697,7 @@
           </p:nvSpPr>
           <p:spPr>
             <a:xfrm>
-              <a:off x="4796690" y="2811150"/>
+              <a:off x="4796690" y="2804572"/>
               <a:ext cx="345385" cy="369332"/>
             </a:xfrm>
             <a:prstGeom prst="rect">
@@ -3301,10 +3751,10 @@
       </p:grpSpPr>
       <p:grpSp>
         <p:nvGrpSpPr>
-          <p:cNvPr id="14" name="Group 13">
+          <p:cNvPr id="15" name="Group 14">
             <a:extLst>
               <a:ext uri="{FF2B5EF4-FFF2-40B4-BE49-F238E27FC236}">
-                <a16:creationId xmlns:a16="http://schemas.microsoft.com/office/drawing/2014/main" id="{35AB2B7C-DB31-924B-A9CD-FAAC4B1A7E81}"/>
+                <a16:creationId xmlns:a16="http://schemas.microsoft.com/office/drawing/2014/main" id="{1520675A-D0BB-6B4B-B005-E4BC276BBEC0}"/>
               </a:ext>
             </a:extLst>
           </p:cNvPr>
@@ -3313,18 +3763,18 @@
         </p:nvGrpSpPr>
         <p:grpSpPr>
           <a:xfrm>
-            <a:off x="228513" y="81054"/>
-            <a:ext cx="6072794" cy="6171063"/>
-            <a:chOff x="228513" y="81054"/>
-            <a:chExt cx="6072794" cy="6171063"/>
+            <a:off x="747609" y="76501"/>
+            <a:ext cx="6042068" cy="6199399"/>
+            <a:chOff x="747609" y="76501"/>
+            <a:chExt cx="6042068" cy="6199399"/>
           </a:xfrm>
         </p:grpSpPr>
         <p:pic>
           <p:nvPicPr>
-            <p:cNvPr id="13" name="Picture 12">
+            <p:cNvPr id="5" name="Picture 4">
               <a:extLst>
                 <a:ext uri="{FF2B5EF4-FFF2-40B4-BE49-F238E27FC236}">
-                  <a16:creationId xmlns:a16="http://schemas.microsoft.com/office/drawing/2014/main" id="{86204E3F-CF1D-F949-9E21-755EA2A9B000}"/>
+                  <a16:creationId xmlns:a16="http://schemas.microsoft.com/office/drawing/2014/main" id="{D118BAA6-70FF-074A-B71F-9CA91B3B6B56}"/>
                 </a:ext>
               </a:extLst>
             </p:cNvPr>
@@ -3341,8 +3791,8 @@
           </p:blipFill>
           <p:spPr>
             <a:xfrm>
-              <a:off x="320001" y="81054"/>
-              <a:ext cx="5981306" cy="1645606"/>
+              <a:off x="777482" y="76501"/>
+              <a:ext cx="6012195" cy="1654104"/>
             </a:xfrm>
             <a:prstGeom prst="rect">
               <a:avLst/>
@@ -3351,10 +3801,10 @@
         </p:pic>
         <p:pic>
           <p:nvPicPr>
-            <p:cNvPr id="11" name="Picture 10">
+            <p:cNvPr id="3" name="Picture 2">
               <a:extLst>
                 <a:ext uri="{FF2B5EF4-FFF2-40B4-BE49-F238E27FC236}">
-                  <a16:creationId xmlns:a16="http://schemas.microsoft.com/office/drawing/2014/main" id="{153C3B9D-D0EE-D742-9056-8533CE86FCDA}"/>
+                  <a16:creationId xmlns:a16="http://schemas.microsoft.com/office/drawing/2014/main" id="{6513F80E-1CE2-1E48-9BD5-BDB372680D0C}"/>
                 </a:ext>
               </a:extLst>
             </p:cNvPr>
@@ -3371,8 +3821,8 @@
           </p:blipFill>
           <p:spPr>
             <a:xfrm>
-              <a:off x="238994" y="1590297"/>
-              <a:ext cx="6062313" cy="1645606"/>
+              <a:off x="777482" y="1598333"/>
+              <a:ext cx="6012195" cy="1647060"/>
             </a:xfrm>
             <a:prstGeom prst="rect">
               <a:avLst/>
@@ -3381,10 +3831,10 @@
         </p:pic>
         <p:pic>
           <p:nvPicPr>
-            <p:cNvPr id="9" name="Picture 8">
+            <p:cNvPr id="8" name="Picture 7">
               <a:extLst>
                 <a:ext uri="{FF2B5EF4-FFF2-40B4-BE49-F238E27FC236}">
-                  <a16:creationId xmlns:a16="http://schemas.microsoft.com/office/drawing/2014/main" id="{2A685E16-14D4-0442-A1D1-C4B303C9F18D}"/>
+                  <a16:creationId xmlns:a16="http://schemas.microsoft.com/office/drawing/2014/main" id="{188A3880-B7FD-5A45-85F8-95ECB0617534}"/>
                 </a:ext>
               </a:extLst>
             </p:cNvPr>
@@ -3401,8 +3851,8 @@
           </p:blipFill>
           <p:spPr>
             <a:xfrm>
-              <a:off x="228513" y="3096981"/>
-              <a:ext cx="6072794" cy="1648452"/>
+              <a:off x="747609" y="3113586"/>
+              <a:ext cx="6042068" cy="1647061"/>
             </a:xfrm>
             <a:prstGeom prst="rect">
               <a:avLst/>
@@ -3411,10 +3861,10 @@
         </p:pic>
         <p:pic>
           <p:nvPicPr>
-            <p:cNvPr id="7" name="Picture 6">
+            <p:cNvPr id="12" name="Picture 11">
               <a:extLst>
                 <a:ext uri="{FF2B5EF4-FFF2-40B4-BE49-F238E27FC236}">
-                  <a16:creationId xmlns:a16="http://schemas.microsoft.com/office/drawing/2014/main" id="{7F3E56FB-20A5-714F-B063-FEA8E6DEE131}"/>
+                  <a16:creationId xmlns:a16="http://schemas.microsoft.com/office/drawing/2014/main" id="{AAE346EF-BBDE-C848-A542-6AAB7D21E667}"/>
                 </a:ext>
               </a:extLst>
             </p:cNvPr>
@@ -3431,8 +3881,8 @@
           </p:blipFill>
           <p:spPr>
             <a:xfrm>
-              <a:off x="289110" y="4605057"/>
-              <a:ext cx="6012197" cy="1647060"/>
+              <a:off x="777482" y="4628840"/>
+              <a:ext cx="6012195" cy="1647060"/>
             </a:xfrm>
             <a:prstGeom prst="rect">
               <a:avLst/>
@@ -3444,6 +3894,1545 @@
     <p:extLst>
       <p:ext uri="{BB962C8B-B14F-4D97-AF65-F5344CB8AC3E}">
         <p14:creationId xmlns:p14="http://schemas.microsoft.com/office/powerpoint/2010/main" val="433377475"/>
+      </p:ext>
+    </p:extLst>
+  </p:cSld>
+  <p:clrMapOvr>
+    <a:masterClrMapping/>
+  </p:clrMapOvr>
+</p:sld>
+</file>
+
+<file path=ppt/slides/slide3.xml><?xml version="1.0" encoding="utf-8"?>
+<p:sld xmlns:a="http://schemas.openxmlformats.org/drawingml/2006/main" xmlns:r="http://schemas.openxmlformats.org/officeDocument/2006/relationships" xmlns:p="http://schemas.openxmlformats.org/presentationml/2006/main">
+  <p:cSld>
+    <p:spTree>
+      <p:nvGrpSpPr>
+        <p:cNvPr id="1" name=""/>
+        <p:cNvGrpSpPr/>
+        <p:nvPr/>
+      </p:nvGrpSpPr>
+      <p:grpSpPr>
+        <a:xfrm>
+          <a:off x="0" y="0"/>
+          <a:ext cx="0" cy="0"/>
+          <a:chOff x="0" y="0"/>
+          <a:chExt cx="0" cy="0"/>
+        </a:xfrm>
+      </p:grpSpPr>
+      <p:grpSp>
+        <p:nvGrpSpPr>
+          <p:cNvPr id="11" name="Group 10">
+            <a:extLst>
+              <a:ext uri="{FF2B5EF4-FFF2-40B4-BE49-F238E27FC236}">
+                <a16:creationId xmlns:a16="http://schemas.microsoft.com/office/drawing/2014/main" id="{F13C41E5-7DF7-9A44-8E48-331EB78D944F}"/>
+              </a:ext>
+            </a:extLst>
+          </p:cNvPr>
+          <p:cNvGrpSpPr/>
+          <p:nvPr/>
+        </p:nvGrpSpPr>
+        <p:grpSpPr>
+          <a:xfrm>
+            <a:off x="717811" y="473862"/>
+            <a:ext cx="7637745" cy="6328071"/>
+            <a:chOff x="717811" y="473862"/>
+            <a:chExt cx="7637745" cy="6328071"/>
+          </a:xfrm>
+        </p:grpSpPr>
+        <p:pic>
+          <p:nvPicPr>
+            <p:cNvPr id="5" name="Picture 4">
+              <a:extLst>
+                <a:ext uri="{FF2B5EF4-FFF2-40B4-BE49-F238E27FC236}">
+                  <a16:creationId xmlns:a16="http://schemas.microsoft.com/office/drawing/2014/main" id="{14B36913-CAFE-EF4E-A74D-9660E7072F29}"/>
+                </a:ext>
+              </a:extLst>
+            </p:cNvPr>
+            <p:cNvPicPr>
+              <a:picLocks noChangeAspect="1"/>
+            </p:cNvPicPr>
+            <p:nvPr/>
+          </p:nvPicPr>
+          <p:blipFill>
+            <a:blip r:embed="rId3"/>
+            <a:stretch>
+              <a:fillRect/>
+            </a:stretch>
+          </p:blipFill>
+          <p:spPr>
+            <a:xfrm>
+              <a:off x="4610702" y="473862"/>
+              <a:ext cx="3744854" cy="2801383"/>
+            </a:xfrm>
+            <a:prstGeom prst="rect">
+              <a:avLst/>
+            </a:prstGeom>
+          </p:spPr>
+        </p:pic>
+        <p:grpSp>
+          <p:nvGrpSpPr>
+            <p:cNvPr id="6" name="Group 5">
+              <a:extLst>
+                <a:ext uri="{FF2B5EF4-FFF2-40B4-BE49-F238E27FC236}">
+                  <a16:creationId xmlns:a16="http://schemas.microsoft.com/office/drawing/2014/main" id="{EB567825-0BF4-0042-B8CE-DF761074F1D6}"/>
+                </a:ext>
+              </a:extLst>
+            </p:cNvPr>
+            <p:cNvGrpSpPr/>
+            <p:nvPr/>
+          </p:nvGrpSpPr>
+          <p:grpSpPr>
+            <a:xfrm>
+              <a:off x="746760" y="1049329"/>
+              <a:ext cx="3853467" cy="2225916"/>
+              <a:chOff x="4043942" y="4346545"/>
+              <a:chExt cx="4618193" cy="2462129"/>
+            </a:xfrm>
+          </p:grpSpPr>
+          <p:pic>
+            <p:nvPicPr>
+              <p:cNvPr id="7" name="Picture 6" descr="A picture containing bird&#10;&#10;Description automatically generated">
+                <a:extLst>
+                  <a:ext uri="{FF2B5EF4-FFF2-40B4-BE49-F238E27FC236}">
+                    <a16:creationId xmlns:a16="http://schemas.microsoft.com/office/drawing/2014/main" id="{FB191A0D-AEC1-4940-863E-ACD1E54F0D77}"/>
+                  </a:ext>
+                </a:extLst>
+              </p:cNvPr>
+              <p:cNvPicPr>
+                <a:picLocks noChangeAspect="1"/>
+              </p:cNvPicPr>
+              <p:nvPr/>
+            </p:nvPicPr>
+            <p:blipFill>
+              <a:blip r:embed="rId4"/>
+              <a:stretch>
+                <a:fillRect/>
+              </a:stretch>
+            </p:blipFill>
+            <p:spPr>
+              <a:xfrm>
+                <a:off x="4043942" y="4346545"/>
+                <a:ext cx="4618193" cy="2462129"/>
+              </a:xfrm>
+              <a:prstGeom prst="rect">
+                <a:avLst/>
+              </a:prstGeom>
+            </p:spPr>
+          </p:pic>
+          <p:sp>
+            <p:nvSpPr>
+              <p:cNvPr id="8" name="Rectangle 7">
+                <a:extLst>
+                  <a:ext uri="{FF2B5EF4-FFF2-40B4-BE49-F238E27FC236}">
+                    <a16:creationId xmlns:a16="http://schemas.microsoft.com/office/drawing/2014/main" id="{F8BCB286-2B1D-0F48-871D-61628E9B0D4D}"/>
+                  </a:ext>
+                </a:extLst>
+              </p:cNvPr>
+              <p:cNvSpPr/>
+              <p:nvPr/>
+            </p:nvSpPr>
+            <p:spPr>
+              <a:xfrm>
+                <a:off x="7320951" y="4413060"/>
+                <a:ext cx="1276710" cy="192942"/>
+              </a:xfrm>
+              <a:prstGeom prst="rect">
+                <a:avLst/>
+              </a:prstGeom>
+              <a:solidFill>
+                <a:srgbClr val="A9D18E">
+                  <a:alpha val="23529"/>
+                </a:srgbClr>
+              </a:solidFill>
+              <a:ln>
+                <a:noFill/>
+              </a:ln>
+            </p:spPr>
+            <p:style>
+              <a:lnRef idx="2">
+                <a:schemeClr val="accent1">
+                  <a:shade val="50000"/>
+                </a:schemeClr>
+              </a:lnRef>
+              <a:fillRef idx="1">
+                <a:schemeClr val="accent1"/>
+              </a:fillRef>
+              <a:effectRef idx="0">
+                <a:schemeClr val="accent1"/>
+              </a:effectRef>
+              <a:fontRef idx="minor">
+                <a:schemeClr val="lt1"/>
+              </a:fontRef>
+            </p:style>
+            <p:txBody>
+              <a:bodyPr rtlCol="0" anchor="ctr"/>
+              <a:lstStyle/>
+              <a:p>
+                <a:pPr algn="ctr"/>
+                <a:endParaRPr lang="en-AU"/>
+              </a:p>
+            </p:txBody>
+          </p:sp>
+          <p:sp>
+            <p:nvSpPr>
+              <p:cNvPr id="9" name="Rectangle 8">
+                <a:extLst>
+                  <a:ext uri="{FF2B5EF4-FFF2-40B4-BE49-F238E27FC236}">
+                    <a16:creationId xmlns:a16="http://schemas.microsoft.com/office/drawing/2014/main" id="{DD152BA4-ADB3-8541-8AEF-46D7599F12A9}"/>
+                  </a:ext>
+                </a:extLst>
+              </p:cNvPr>
+              <p:cNvSpPr/>
+              <p:nvPr/>
+            </p:nvSpPr>
+            <p:spPr>
+              <a:xfrm>
+                <a:off x="7493479" y="4625845"/>
+                <a:ext cx="897147" cy="192942"/>
+              </a:xfrm>
+              <a:prstGeom prst="rect">
+                <a:avLst/>
+              </a:prstGeom>
+              <a:solidFill>
+                <a:srgbClr val="A9D18E">
+                  <a:alpha val="23529"/>
+                </a:srgbClr>
+              </a:solidFill>
+              <a:ln>
+                <a:noFill/>
+              </a:ln>
+            </p:spPr>
+            <p:style>
+              <a:lnRef idx="2">
+                <a:schemeClr val="accent1">
+                  <a:shade val="50000"/>
+                </a:schemeClr>
+              </a:lnRef>
+              <a:fillRef idx="1">
+                <a:schemeClr val="accent1"/>
+              </a:fillRef>
+              <a:effectRef idx="0">
+                <a:schemeClr val="accent1"/>
+              </a:effectRef>
+              <a:fontRef idx="minor">
+                <a:schemeClr val="lt1"/>
+              </a:fontRef>
+            </p:style>
+            <p:txBody>
+              <a:bodyPr rtlCol="0" anchor="ctr"/>
+              <a:lstStyle/>
+              <a:p>
+                <a:pPr algn="ctr"/>
+                <a:endParaRPr lang="en-AU"/>
+              </a:p>
+            </p:txBody>
+          </p:sp>
+          <p:sp>
+            <p:nvSpPr>
+              <p:cNvPr id="10" name="Rectangle 9">
+                <a:extLst>
+                  <a:ext uri="{FF2B5EF4-FFF2-40B4-BE49-F238E27FC236}">
+                    <a16:creationId xmlns:a16="http://schemas.microsoft.com/office/drawing/2014/main" id="{5B46B274-8716-4646-A1C4-12CE59D6990C}"/>
+                  </a:ext>
+                </a:extLst>
+              </p:cNvPr>
+              <p:cNvSpPr/>
+              <p:nvPr/>
+            </p:nvSpPr>
+            <p:spPr>
+              <a:xfrm>
+                <a:off x="4093898" y="6360347"/>
+                <a:ext cx="4003429" cy="388309"/>
+              </a:xfrm>
+              <a:prstGeom prst="rect">
+                <a:avLst/>
+              </a:prstGeom>
+              <a:solidFill>
+                <a:srgbClr val="A9D18E">
+                  <a:alpha val="23529"/>
+                </a:srgbClr>
+              </a:solidFill>
+              <a:ln>
+                <a:noFill/>
+              </a:ln>
+            </p:spPr>
+            <p:style>
+              <a:lnRef idx="2">
+                <a:schemeClr val="accent1">
+                  <a:shade val="50000"/>
+                </a:schemeClr>
+              </a:lnRef>
+              <a:fillRef idx="1">
+                <a:schemeClr val="accent1"/>
+              </a:fillRef>
+              <a:effectRef idx="0">
+                <a:schemeClr val="accent1"/>
+              </a:effectRef>
+              <a:fontRef idx="minor">
+                <a:schemeClr val="lt1"/>
+              </a:fontRef>
+            </p:style>
+            <p:txBody>
+              <a:bodyPr rtlCol="0" anchor="ctr"/>
+              <a:lstStyle/>
+              <a:p>
+                <a:pPr algn="ctr"/>
+                <a:endParaRPr lang="en-AU"/>
+              </a:p>
+            </p:txBody>
+          </p:sp>
+        </p:grpSp>
+        <p:pic>
+          <p:nvPicPr>
+            <p:cNvPr id="2050" name="Picture 2">
+              <a:extLst>
+                <a:ext uri="{FF2B5EF4-FFF2-40B4-BE49-F238E27FC236}">
+                  <a16:creationId xmlns:a16="http://schemas.microsoft.com/office/drawing/2014/main" id="{5B72F5E7-16D5-3741-8D95-3BFF04374673}"/>
+                </a:ext>
+              </a:extLst>
+            </p:cNvPr>
+            <p:cNvPicPr>
+              <a:picLocks noChangeAspect="1" noChangeArrowheads="1"/>
+            </p:cNvPicPr>
+            <p:nvPr/>
+          </p:nvPicPr>
+          <p:blipFill>
+            <a:blip r:embed="rId5">
+              <a:extLst>
+                <a:ext uri="{28A0092B-C50C-407E-A947-70E740481C1C}">
+                  <a14:useLocalDpi xmlns:a14="http://schemas.microsoft.com/office/drawing/2010/main" val="0"/>
+                </a:ext>
+              </a:extLst>
+            </a:blip>
+            <a:srcRect/>
+            <a:stretch>
+              <a:fillRect/>
+            </a:stretch>
+          </p:blipFill>
+          <p:spPr bwMode="auto">
+            <a:xfrm>
+              <a:off x="717811" y="3335379"/>
+              <a:ext cx="3612598" cy="3466554"/>
+            </a:xfrm>
+            <a:prstGeom prst="rect">
+              <a:avLst/>
+            </a:prstGeom>
+            <a:noFill/>
+            <a:extLst>
+              <a:ext uri="{909E8E84-426E-40DD-AFC4-6F175D3DCCD1}">
+                <a14:hiddenFill xmlns:a14="http://schemas.microsoft.com/office/drawing/2010/main">
+                  <a:solidFill>
+                    <a:srgbClr val="FFFFFF"/>
+                  </a:solidFill>
+                </a14:hiddenFill>
+              </a:ext>
+            </a:extLst>
+          </p:spPr>
+        </p:pic>
+        <p:pic>
+          <p:nvPicPr>
+            <p:cNvPr id="2052" name="Picture 4">
+              <a:extLst>
+                <a:ext uri="{FF2B5EF4-FFF2-40B4-BE49-F238E27FC236}">
+                  <a16:creationId xmlns:a16="http://schemas.microsoft.com/office/drawing/2014/main" id="{248ADB5A-B019-D54E-80AA-5A0EA1233743}"/>
+                </a:ext>
+              </a:extLst>
+            </p:cNvPr>
+            <p:cNvPicPr>
+              <a:picLocks noChangeAspect="1" noChangeArrowheads="1"/>
+            </p:cNvPicPr>
+            <p:nvPr/>
+          </p:nvPicPr>
+          <p:blipFill>
+            <a:blip r:embed="rId6">
+              <a:extLst>
+                <a:ext uri="{28A0092B-C50C-407E-A947-70E740481C1C}">
+                  <a14:useLocalDpi xmlns:a14="http://schemas.microsoft.com/office/drawing/2010/main" val="0"/>
+                </a:ext>
+              </a:extLst>
+            </a:blip>
+            <a:srcRect/>
+            <a:stretch>
+              <a:fillRect/>
+            </a:stretch>
+          </p:blipFill>
+          <p:spPr bwMode="auto">
+            <a:xfrm>
+              <a:off x="4731779" y="3335379"/>
+              <a:ext cx="3612598" cy="3466554"/>
+            </a:xfrm>
+            <a:prstGeom prst="rect">
+              <a:avLst/>
+            </a:prstGeom>
+            <a:noFill/>
+            <a:extLst>
+              <a:ext uri="{909E8E84-426E-40DD-AFC4-6F175D3DCCD1}">
+                <a14:hiddenFill xmlns:a14="http://schemas.microsoft.com/office/drawing/2010/main">
+                  <a:solidFill>
+                    <a:srgbClr val="FFFFFF"/>
+                  </a:solidFill>
+                </a14:hiddenFill>
+              </a:ext>
+            </a:extLst>
+          </p:spPr>
+        </p:pic>
+        <p:sp>
+          <p:nvSpPr>
+            <p:cNvPr id="13" name="TextBox 12">
+              <a:extLst>
+                <a:ext uri="{FF2B5EF4-FFF2-40B4-BE49-F238E27FC236}">
+                  <a16:creationId xmlns:a16="http://schemas.microsoft.com/office/drawing/2014/main" id="{771AFD51-AB28-674A-84A3-E8326E3DC5AA}"/>
+                </a:ext>
+              </a:extLst>
+            </p:cNvPr>
+            <p:cNvSpPr txBox="1"/>
+            <p:nvPr/>
+          </p:nvSpPr>
+          <p:spPr>
+            <a:xfrm>
+              <a:off x="795366" y="485735"/>
+              <a:ext cx="345385" cy="369332"/>
+            </a:xfrm>
+            <a:prstGeom prst="rect">
+              <a:avLst/>
+            </a:prstGeom>
+            <a:noFill/>
+          </p:spPr>
+          <p:txBody>
+            <a:bodyPr wrap="square" rtlCol="0">
+              <a:spAutoFit/>
+            </a:bodyPr>
+            <a:lstStyle/>
+            <a:p>
+              <a:r>
+                <a:rPr lang="en-AU" dirty="0"/>
+                <a:t>A</a:t>
+              </a:r>
+            </a:p>
+          </p:txBody>
+        </p:sp>
+        <p:sp>
+          <p:nvSpPr>
+            <p:cNvPr id="14" name="TextBox 13">
+              <a:extLst>
+                <a:ext uri="{FF2B5EF4-FFF2-40B4-BE49-F238E27FC236}">
+                  <a16:creationId xmlns:a16="http://schemas.microsoft.com/office/drawing/2014/main" id="{D6DE17B7-21DB-4942-B21B-DCBA8F496413}"/>
+                </a:ext>
+              </a:extLst>
+            </p:cNvPr>
+            <p:cNvSpPr txBox="1"/>
+            <p:nvPr/>
+          </p:nvSpPr>
+          <p:spPr>
+            <a:xfrm>
+              <a:off x="737308" y="3116545"/>
+              <a:ext cx="345385" cy="369332"/>
+            </a:xfrm>
+            <a:prstGeom prst="rect">
+              <a:avLst/>
+            </a:prstGeom>
+            <a:noFill/>
+          </p:spPr>
+          <p:txBody>
+            <a:bodyPr wrap="square" rtlCol="0">
+              <a:spAutoFit/>
+            </a:bodyPr>
+            <a:lstStyle/>
+            <a:p>
+              <a:r>
+                <a:rPr lang="en-AU" dirty="0"/>
+                <a:t>C</a:t>
+              </a:r>
+            </a:p>
+          </p:txBody>
+        </p:sp>
+        <p:sp>
+          <p:nvSpPr>
+            <p:cNvPr id="15" name="TextBox 14">
+              <a:extLst>
+                <a:ext uri="{FF2B5EF4-FFF2-40B4-BE49-F238E27FC236}">
+                  <a16:creationId xmlns:a16="http://schemas.microsoft.com/office/drawing/2014/main" id="{861C194B-855D-7142-BB26-626DA9F8728D}"/>
+                </a:ext>
+              </a:extLst>
+            </p:cNvPr>
+            <p:cNvSpPr txBox="1"/>
+            <p:nvPr/>
+          </p:nvSpPr>
+          <p:spPr>
+            <a:xfrm>
+              <a:off x="4792601" y="489397"/>
+              <a:ext cx="345385" cy="369332"/>
+            </a:xfrm>
+            <a:prstGeom prst="rect">
+              <a:avLst/>
+            </a:prstGeom>
+            <a:noFill/>
+          </p:spPr>
+          <p:txBody>
+            <a:bodyPr wrap="square" rtlCol="0">
+              <a:spAutoFit/>
+            </a:bodyPr>
+            <a:lstStyle/>
+            <a:p>
+              <a:r>
+                <a:rPr lang="en-AU" dirty="0"/>
+                <a:t>B</a:t>
+              </a:r>
+            </a:p>
+          </p:txBody>
+        </p:sp>
+        <p:sp>
+          <p:nvSpPr>
+            <p:cNvPr id="16" name="TextBox 15">
+              <a:extLst>
+                <a:ext uri="{FF2B5EF4-FFF2-40B4-BE49-F238E27FC236}">
+                  <a16:creationId xmlns:a16="http://schemas.microsoft.com/office/drawing/2014/main" id="{AE9A39BE-864B-2C45-BAE8-1C36A40A1323}"/>
+                </a:ext>
+              </a:extLst>
+            </p:cNvPr>
+            <p:cNvSpPr txBox="1"/>
+            <p:nvPr/>
+          </p:nvSpPr>
+          <p:spPr>
+            <a:xfrm>
+              <a:off x="4796690" y="3116545"/>
+              <a:ext cx="345385" cy="369332"/>
+            </a:xfrm>
+            <a:prstGeom prst="rect">
+              <a:avLst/>
+            </a:prstGeom>
+            <a:noFill/>
+          </p:spPr>
+          <p:txBody>
+            <a:bodyPr wrap="square" rtlCol="0">
+              <a:spAutoFit/>
+            </a:bodyPr>
+            <a:lstStyle/>
+            <a:p>
+              <a:r>
+                <a:rPr lang="en-AU" dirty="0"/>
+                <a:t>D</a:t>
+              </a:r>
+            </a:p>
+          </p:txBody>
+        </p:sp>
+      </p:grpSp>
+    </p:spTree>
+    <p:extLst>
+      <p:ext uri="{BB962C8B-B14F-4D97-AF65-F5344CB8AC3E}">
+        <p14:creationId xmlns:p14="http://schemas.microsoft.com/office/powerpoint/2010/main" val="1046586537"/>
+      </p:ext>
+    </p:extLst>
+  </p:cSld>
+  <p:clrMapOvr>
+    <a:masterClrMapping/>
+  </p:clrMapOvr>
+</p:sld>
+</file>
+
+<file path=ppt/slides/slide4.xml><?xml version="1.0" encoding="utf-8"?>
+<p:sld xmlns:a="http://schemas.openxmlformats.org/drawingml/2006/main" xmlns:r="http://schemas.openxmlformats.org/officeDocument/2006/relationships" xmlns:p="http://schemas.openxmlformats.org/presentationml/2006/main">
+  <p:cSld>
+    <p:spTree>
+      <p:nvGrpSpPr>
+        <p:cNvPr id="1" name=""/>
+        <p:cNvGrpSpPr/>
+        <p:nvPr/>
+      </p:nvGrpSpPr>
+      <p:grpSpPr>
+        <a:xfrm>
+          <a:off x="0" y="0"/>
+          <a:ext cx="0" cy="0"/>
+          <a:chOff x="0" y="0"/>
+          <a:chExt cx="0" cy="0"/>
+        </a:xfrm>
+      </p:grpSpPr>
+      <p:grpSp>
+        <p:nvGrpSpPr>
+          <p:cNvPr id="19" name="Group 18">
+            <a:extLst>
+              <a:ext uri="{FF2B5EF4-FFF2-40B4-BE49-F238E27FC236}">
+                <a16:creationId xmlns:a16="http://schemas.microsoft.com/office/drawing/2014/main" id="{8D8ED702-325A-6448-BC48-C8EDD683C401}"/>
+              </a:ext>
+            </a:extLst>
+          </p:cNvPr>
+          <p:cNvGrpSpPr/>
+          <p:nvPr/>
+        </p:nvGrpSpPr>
+        <p:grpSpPr>
+          <a:xfrm>
+            <a:off x="4093899" y="173037"/>
+            <a:ext cx="3935701" cy="1693565"/>
+            <a:chOff x="4093899" y="173037"/>
+            <a:chExt cx="3935701" cy="1693565"/>
+          </a:xfrm>
+        </p:grpSpPr>
+        <p:pic>
+          <p:nvPicPr>
+            <p:cNvPr id="12" name="Picture 11" descr="A screenshot of a cell phone&#10;&#10;Description automatically generated">
+              <a:extLst>
+                <a:ext uri="{FF2B5EF4-FFF2-40B4-BE49-F238E27FC236}">
+                  <a16:creationId xmlns:a16="http://schemas.microsoft.com/office/drawing/2014/main" id="{EC4EBFBA-ADF1-9E4F-9404-C3DEE1584997}"/>
+                </a:ext>
+              </a:extLst>
+            </p:cNvPr>
+            <p:cNvPicPr>
+              <a:picLocks noChangeAspect="1"/>
+            </p:cNvPicPr>
+            <p:nvPr/>
+          </p:nvPicPr>
+          <p:blipFill>
+            <a:blip r:embed="rId3"/>
+            <a:stretch>
+              <a:fillRect/>
+            </a:stretch>
+          </p:blipFill>
+          <p:spPr>
+            <a:xfrm>
+              <a:off x="4125559" y="173037"/>
+              <a:ext cx="3904041" cy="1693565"/>
+            </a:xfrm>
+            <a:prstGeom prst="rect">
+              <a:avLst/>
+            </a:prstGeom>
+          </p:spPr>
+        </p:pic>
+        <p:sp>
+          <p:nvSpPr>
+            <p:cNvPr id="16" name="Rectangle 15">
+              <a:extLst>
+                <a:ext uri="{FF2B5EF4-FFF2-40B4-BE49-F238E27FC236}">
+                  <a16:creationId xmlns:a16="http://schemas.microsoft.com/office/drawing/2014/main" id="{DDB96AFC-65A8-F347-8DE8-BC6A03971681}"/>
+                </a:ext>
+              </a:extLst>
+            </p:cNvPr>
+            <p:cNvSpPr/>
+            <p:nvPr/>
+          </p:nvSpPr>
+          <p:spPr>
+            <a:xfrm>
+              <a:off x="6664569" y="261548"/>
+              <a:ext cx="1365031" cy="192942"/>
+            </a:xfrm>
+            <a:prstGeom prst="rect">
+              <a:avLst/>
+            </a:prstGeom>
+            <a:solidFill>
+              <a:srgbClr val="A9D18E">
+                <a:alpha val="23529"/>
+              </a:srgbClr>
+            </a:solidFill>
+            <a:ln>
+              <a:noFill/>
+            </a:ln>
+          </p:spPr>
+          <p:style>
+            <a:lnRef idx="2">
+              <a:schemeClr val="accent1">
+                <a:shade val="50000"/>
+              </a:schemeClr>
+            </a:lnRef>
+            <a:fillRef idx="1">
+              <a:schemeClr val="accent1"/>
+            </a:fillRef>
+            <a:effectRef idx="0">
+              <a:schemeClr val="accent1"/>
+            </a:effectRef>
+            <a:fontRef idx="minor">
+              <a:schemeClr val="lt1"/>
+            </a:fontRef>
+          </p:style>
+          <p:txBody>
+            <a:bodyPr rtlCol="0" anchor="ctr"/>
+            <a:lstStyle/>
+            <a:p>
+              <a:pPr algn="ctr"/>
+              <a:endParaRPr lang="en-AU"/>
+            </a:p>
+          </p:txBody>
+        </p:sp>
+        <p:sp>
+          <p:nvSpPr>
+            <p:cNvPr id="23" name="Rectangle 22">
+              <a:extLst>
+                <a:ext uri="{FF2B5EF4-FFF2-40B4-BE49-F238E27FC236}">
+                  <a16:creationId xmlns:a16="http://schemas.microsoft.com/office/drawing/2014/main" id="{A06CB793-90AD-6145-ADF3-81D0EF7447AC}"/>
+                </a:ext>
+              </a:extLst>
+            </p:cNvPr>
+            <p:cNvSpPr/>
+            <p:nvPr/>
+          </p:nvSpPr>
+          <p:spPr>
+            <a:xfrm>
+              <a:off x="6785340" y="451329"/>
+              <a:ext cx="1001438" cy="192942"/>
+            </a:xfrm>
+            <a:prstGeom prst="rect">
+              <a:avLst/>
+            </a:prstGeom>
+            <a:solidFill>
+              <a:srgbClr val="A9D18E">
+                <a:alpha val="23529"/>
+              </a:srgbClr>
+            </a:solidFill>
+            <a:ln>
+              <a:noFill/>
+            </a:ln>
+          </p:spPr>
+          <p:style>
+            <a:lnRef idx="2">
+              <a:schemeClr val="accent1">
+                <a:shade val="50000"/>
+              </a:schemeClr>
+            </a:lnRef>
+            <a:fillRef idx="1">
+              <a:schemeClr val="accent1"/>
+            </a:fillRef>
+            <a:effectRef idx="0">
+              <a:schemeClr val="accent1"/>
+            </a:effectRef>
+            <a:fontRef idx="minor">
+              <a:schemeClr val="lt1"/>
+            </a:fontRef>
+          </p:style>
+          <p:txBody>
+            <a:bodyPr rtlCol="0" anchor="ctr"/>
+            <a:lstStyle/>
+            <a:p>
+              <a:pPr algn="ctr"/>
+              <a:endParaRPr lang="en-AU"/>
+            </a:p>
+          </p:txBody>
+        </p:sp>
+        <p:sp>
+          <p:nvSpPr>
+            <p:cNvPr id="24" name="Rectangle 23">
+              <a:extLst>
+                <a:ext uri="{FF2B5EF4-FFF2-40B4-BE49-F238E27FC236}">
+                  <a16:creationId xmlns:a16="http://schemas.microsoft.com/office/drawing/2014/main" id="{28DD454E-F3EF-4546-8366-9E47EC8C464B}"/>
+                </a:ext>
+              </a:extLst>
+            </p:cNvPr>
+            <p:cNvSpPr/>
+            <p:nvPr/>
+          </p:nvSpPr>
+          <p:spPr>
+            <a:xfrm>
+              <a:off x="4093899" y="1434739"/>
+              <a:ext cx="3129286" cy="388309"/>
+            </a:xfrm>
+            <a:prstGeom prst="rect">
+              <a:avLst/>
+            </a:prstGeom>
+            <a:solidFill>
+              <a:srgbClr val="A9D18E">
+                <a:alpha val="23529"/>
+              </a:srgbClr>
+            </a:solidFill>
+            <a:ln>
+              <a:noFill/>
+            </a:ln>
+          </p:spPr>
+          <p:style>
+            <a:lnRef idx="2">
+              <a:schemeClr val="accent1">
+                <a:shade val="50000"/>
+              </a:schemeClr>
+            </a:lnRef>
+            <a:fillRef idx="1">
+              <a:schemeClr val="accent1"/>
+            </a:fillRef>
+            <a:effectRef idx="0">
+              <a:schemeClr val="accent1"/>
+            </a:effectRef>
+            <a:fontRef idx="minor">
+              <a:schemeClr val="lt1"/>
+            </a:fontRef>
+          </p:style>
+          <p:txBody>
+            <a:bodyPr rtlCol="0" anchor="ctr"/>
+            <a:lstStyle/>
+            <a:p>
+              <a:pPr algn="ctr"/>
+              <a:endParaRPr lang="en-AU"/>
+            </a:p>
+          </p:txBody>
+        </p:sp>
+      </p:grpSp>
+      <p:grpSp>
+        <p:nvGrpSpPr>
+          <p:cNvPr id="18" name="Group 17">
+            <a:extLst>
+              <a:ext uri="{FF2B5EF4-FFF2-40B4-BE49-F238E27FC236}">
+                <a16:creationId xmlns:a16="http://schemas.microsoft.com/office/drawing/2014/main" id="{FEA0391A-11F5-8F46-9847-266922FDA5E1}"/>
+              </a:ext>
+            </a:extLst>
+          </p:cNvPr>
+          <p:cNvGrpSpPr/>
+          <p:nvPr/>
+        </p:nvGrpSpPr>
+        <p:grpSpPr>
+          <a:xfrm>
+            <a:off x="4043942" y="2040035"/>
+            <a:ext cx="3985658" cy="2142461"/>
+            <a:chOff x="4043942" y="2040035"/>
+            <a:chExt cx="3985658" cy="2142461"/>
+          </a:xfrm>
+        </p:grpSpPr>
+        <p:pic>
+          <p:nvPicPr>
+            <p:cNvPr id="14" name="Picture 13" descr="A screenshot of a cell phone&#10;&#10;Description automatically generated">
+              <a:extLst>
+                <a:ext uri="{FF2B5EF4-FFF2-40B4-BE49-F238E27FC236}">
+                  <a16:creationId xmlns:a16="http://schemas.microsoft.com/office/drawing/2014/main" id="{053C93BD-89EE-6F43-945D-BD2E1DB2A629}"/>
+                </a:ext>
+              </a:extLst>
+            </p:cNvPr>
+            <p:cNvPicPr>
+              <a:picLocks noChangeAspect="1"/>
+            </p:cNvPicPr>
+            <p:nvPr/>
+          </p:nvPicPr>
+          <p:blipFill>
+            <a:blip r:embed="rId4"/>
+            <a:stretch>
+              <a:fillRect/>
+            </a:stretch>
+          </p:blipFill>
+          <p:spPr>
+            <a:xfrm>
+              <a:off x="4043942" y="2040035"/>
+              <a:ext cx="3985658" cy="2142461"/>
+            </a:xfrm>
+            <a:prstGeom prst="rect">
+              <a:avLst/>
+            </a:prstGeom>
+          </p:spPr>
+        </p:pic>
+        <p:sp>
+          <p:nvSpPr>
+            <p:cNvPr id="25" name="Rectangle 24">
+              <a:extLst>
+                <a:ext uri="{FF2B5EF4-FFF2-40B4-BE49-F238E27FC236}">
+                  <a16:creationId xmlns:a16="http://schemas.microsoft.com/office/drawing/2014/main" id="{83E75882-92DA-9949-8382-92DC4D21AF21}"/>
+                </a:ext>
+              </a:extLst>
+            </p:cNvPr>
+            <p:cNvSpPr/>
+            <p:nvPr/>
+          </p:nvSpPr>
+          <p:spPr>
+            <a:xfrm>
+              <a:off x="6664569" y="2136043"/>
+              <a:ext cx="1315074" cy="192942"/>
+            </a:xfrm>
+            <a:prstGeom prst="rect">
+              <a:avLst/>
+            </a:prstGeom>
+            <a:solidFill>
+              <a:srgbClr val="A9D18E">
+                <a:alpha val="23529"/>
+              </a:srgbClr>
+            </a:solidFill>
+            <a:ln>
+              <a:noFill/>
+            </a:ln>
+          </p:spPr>
+          <p:style>
+            <a:lnRef idx="2">
+              <a:schemeClr val="accent1">
+                <a:shade val="50000"/>
+              </a:schemeClr>
+            </a:lnRef>
+            <a:fillRef idx="1">
+              <a:schemeClr val="accent1"/>
+            </a:fillRef>
+            <a:effectRef idx="0">
+              <a:schemeClr val="accent1"/>
+            </a:effectRef>
+            <a:fontRef idx="minor">
+              <a:schemeClr val="lt1"/>
+            </a:fontRef>
+          </p:style>
+          <p:txBody>
+            <a:bodyPr rtlCol="0" anchor="ctr"/>
+            <a:lstStyle/>
+            <a:p>
+              <a:pPr algn="ctr"/>
+              <a:endParaRPr lang="en-AU"/>
+            </a:p>
+          </p:txBody>
+        </p:sp>
+        <p:sp>
+          <p:nvSpPr>
+            <p:cNvPr id="26" name="Rectangle 25">
+              <a:extLst>
+                <a:ext uri="{FF2B5EF4-FFF2-40B4-BE49-F238E27FC236}">
+                  <a16:creationId xmlns:a16="http://schemas.microsoft.com/office/drawing/2014/main" id="{345CECF6-556C-4448-9588-7A5EDE568198}"/>
+                </a:ext>
+              </a:extLst>
+            </p:cNvPr>
+            <p:cNvSpPr/>
+            <p:nvPr/>
+          </p:nvSpPr>
+          <p:spPr>
+            <a:xfrm>
+              <a:off x="6826369" y="2325824"/>
+              <a:ext cx="910451" cy="192942"/>
+            </a:xfrm>
+            <a:prstGeom prst="rect">
+              <a:avLst/>
+            </a:prstGeom>
+            <a:solidFill>
+              <a:srgbClr val="A9D18E">
+                <a:alpha val="23529"/>
+              </a:srgbClr>
+            </a:solidFill>
+            <a:ln>
+              <a:noFill/>
+            </a:ln>
+          </p:spPr>
+          <p:style>
+            <a:lnRef idx="2">
+              <a:schemeClr val="accent1">
+                <a:shade val="50000"/>
+              </a:schemeClr>
+            </a:lnRef>
+            <a:fillRef idx="1">
+              <a:schemeClr val="accent1"/>
+            </a:fillRef>
+            <a:effectRef idx="0">
+              <a:schemeClr val="accent1"/>
+            </a:effectRef>
+            <a:fontRef idx="minor">
+              <a:schemeClr val="lt1"/>
+            </a:fontRef>
+          </p:style>
+          <p:txBody>
+            <a:bodyPr rtlCol="0" anchor="ctr"/>
+            <a:lstStyle/>
+            <a:p>
+              <a:pPr algn="ctr"/>
+              <a:endParaRPr lang="en-AU"/>
+            </a:p>
+          </p:txBody>
+        </p:sp>
+        <p:sp>
+          <p:nvSpPr>
+            <p:cNvPr id="27" name="Rectangle 26">
+              <a:extLst>
+                <a:ext uri="{FF2B5EF4-FFF2-40B4-BE49-F238E27FC236}">
+                  <a16:creationId xmlns:a16="http://schemas.microsoft.com/office/drawing/2014/main" id="{47F9715C-1BB0-3E42-BA2C-24FE1B0A00F0}"/>
+                </a:ext>
+              </a:extLst>
+            </p:cNvPr>
+            <p:cNvSpPr/>
+            <p:nvPr/>
+          </p:nvSpPr>
+          <p:spPr>
+            <a:xfrm>
+              <a:off x="4093899" y="3727568"/>
+              <a:ext cx="3129286" cy="388309"/>
+            </a:xfrm>
+            <a:prstGeom prst="rect">
+              <a:avLst/>
+            </a:prstGeom>
+            <a:solidFill>
+              <a:srgbClr val="A9D18E">
+                <a:alpha val="23529"/>
+              </a:srgbClr>
+            </a:solidFill>
+            <a:ln>
+              <a:noFill/>
+            </a:ln>
+          </p:spPr>
+          <p:style>
+            <a:lnRef idx="2">
+              <a:schemeClr val="accent1">
+                <a:shade val="50000"/>
+              </a:schemeClr>
+            </a:lnRef>
+            <a:fillRef idx="1">
+              <a:schemeClr val="accent1"/>
+            </a:fillRef>
+            <a:effectRef idx="0">
+              <a:schemeClr val="accent1"/>
+            </a:effectRef>
+            <a:fontRef idx="minor">
+              <a:schemeClr val="lt1"/>
+            </a:fontRef>
+          </p:style>
+          <p:txBody>
+            <a:bodyPr rtlCol="0" anchor="ctr"/>
+            <a:lstStyle/>
+            <a:p>
+              <a:pPr algn="ctr"/>
+              <a:endParaRPr lang="en-AU"/>
+            </a:p>
+          </p:txBody>
+        </p:sp>
+      </p:grpSp>
+      <p:grpSp>
+        <p:nvGrpSpPr>
+          <p:cNvPr id="17" name="Group 16">
+            <a:extLst>
+              <a:ext uri="{FF2B5EF4-FFF2-40B4-BE49-F238E27FC236}">
+                <a16:creationId xmlns:a16="http://schemas.microsoft.com/office/drawing/2014/main" id="{77FCF2C4-D609-C541-940D-A18A92D58E90}"/>
+              </a:ext>
+            </a:extLst>
+          </p:cNvPr>
+          <p:cNvGrpSpPr/>
+          <p:nvPr/>
+        </p:nvGrpSpPr>
+        <p:grpSpPr>
+          <a:xfrm>
+            <a:off x="4043942" y="4346545"/>
+            <a:ext cx="4618193" cy="2462129"/>
+            <a:chOff x="4043942" y="4346545"/>
+            <a:chExt cx="4618193" cy="2462129"/>
+          </a:xfrm>
+        </p:grpSpPr>
+        <p:pic>
+          <p:nvPicPr>
+            <p:cNvPr id="10" name="Picture 9" descr="A picture containing bird&#10;&#10;Description automatically generated">
+              <a:extLst>
+                <a:ext uri="{FF2B5EF4-FFF2-40B4-BE49-F238E27FC236}">
+                  <a16:creationId xmlns:a16="http://schemas.microsoft.com/office/drawing/2014/main" id="{37A93C3F-FC07-9B4E-BA3F-A4535863CE2A}"/>
+                </a:ext>
+              </a:extLst>
+            </p:cNvPr>
+            <p:cNvPicPr>
+              <a:picLocks noChangeAspect="1"/>
+            </p:cNvPicPr>
+            <p:nvPr/>
+          </p:nvPicPr>
+          <p:blipFill>
+            <a:blip r:embed="rId5"/>
+            <a:stretch>
+              <a:fillRect/>
+            </a:stretch>
+          </p:blipFill>
+          <p:spPr>
+            <a:xfrm>
+              <a:off x="4043942" y="4346545"/>
+              <a:ext cx="4618193" cy="2462129"/>
+            </a:xfrm>
+            <a:prstGeom prst="rect">
+              <a:avLst/>
+            </a:prstGeom>
+          </p:spPr>
+        </p:pic>
+        <p:sp>
+          <p:nvSpPr>
+            <p:cNvPr id="28" name="Rectangle 27">
+              <a:extLst>
+                <a:ext uri="{FF2B5EF4-FFF2-40B4-BE49-F238E27FC236}">
+                  <a16:creationId xmlns:a16="http://schemas.microsoft.com/office/drawing/2014/main" id="{FE134813-218D-C94A-8036-58FE1A6138AE}"/>
+                </a:ext>
+              </a:extLst>
+            </p:cNvPr>
+            <p:cNvSpPr/>
+            <p:nvPr/>
+          </p:nvSpPr>
+          <p:spPr>
+            <a:xfrm>
+              <a:off x="7320951" y="4413060"/>
+              <a:ext cx="1276710" cy="192942"/>
+            </a:xfrm>
+            <a:prstGeom prst="rect">
+              <a:avLst/>
+            </a:prstGeom>
+            <a:solidFill>
+              <a:srgbClr val="A9D18E">
+                <a:alpha val="23529"/>
+              </a:srgbClr>
+            </a:solidFill>
+            <a:ln>
+              <a:noFill/>
+            </a:ln>
+          </p:spPr>
+          <p:style>
+            <a:lnRef idx="2">
+              <a:schemeClr val="accent1">
+                <a:shade val="50000"/>
+              </a:schemeClr>
+            </a:lnRef>
+            <a:fillRef idx="1">
+              <a:schemeClr val="accent1"/>
+            </a:fillRef>
+            <a:effectRef idx="0">
+              <a:schemeClr val="accent1"/>
+            </a:effectRef>
+            <a:fontRef idx="minor">
+              <a:schemeClr val="lt1"/>
+            </a:fontRef>
+          </p:style>
+          <p:txBody>
+            <a:bodyPr rtlCol="0" anchor="ctr"/>
+            <a:lstStyle/>
+            <a:p>
+              <a:pPr algn="ctr"/>
+              <a:endParaRPr lang="en-AU"/>
+            </a:p>
+          </p:txBody>
+        </p:sp>
+        <p:sp>
+          <p:nvSpPr>
+            <p:cNvPr id="29" name="Rectangle 28">
+              <a:extLst>
+                <a:ext uri="{FF2B5EF4-FFF2-40B4-BE49-F238E27FC236}">
+                  <a16:creationId xmlns:a16="http://schemas.microsoft.com/office/drawing/2014/main" id="{9FBE2BB5-FA7F-8D43-885E-940AE06A7748}"/>
+                </a:ext>
+              </a:extLst>
+            </p:cNvPr>
+            <p:cNvSpPr/>
+            <p:nvPr/>
+          </p:nvSpPr>
+          <p:spPr>
+            <a:xfrm>
+              <a:off x="7493479" y="4625845"/>
+              <a:ext cx="897147" cy="192942"/>
+            </a:xfrm>
+            <a:prstGeom prst="rect">
+              <a:avLst/>
+            </a:prstGeom>
+            <a:solidFill>
+              <a:srgbClr val="A9D18E">
+                <a:alpha val="23529"/>
+              </a:srgbClr>
+            </a:solidFill>
+            <a:ln>
+              <a:noFill/>
+            </a:ln>
+          </p:spPr>
+          <p:style>
+            <a:lnRef idx="2">
+              <a:schemeClr val="accent1">
+                <a:shade val="50000"/>
+              </a:schemeClr>
+            </a:lnRef>
+            <a:fillRef idx="1">
+              <a:schemeClr val="accent1"/>
+            </a:fillRef>
+            <a:effectRef idx="0">
+              <a:schemeClr val="accent1"/>
+            </a:effectRef>
+            <a:fontRef idx="minor">
+              <a:schemeClr val="lt1"/>
+            </a:fontRef>
+          </p:style>
+          <p:txBody>
+            <a:bodyPr rtlCol="0" anchor="ctr"/>
+            <a:lstStyle/>
+            <a:p>
+              <a:pPr algn="ctr"/>
+              <a:endParaRPr lang="en-AU"/>
+            </a:p>
+          </p:txBody>
+        </p:sp>
+        <p:sp>
+          <p:nvSpPr>
+            <p:cNvPr id="30" name="Rectangle 29">
+              <a:extLst>
+                <a:ext uri="{FF2B5EF4-FFF2-40B4-BE49-F238E27FC236}">
+                  <a16:creationId xmlns:a16="http://schemas.microsoft.com/office/drawing/2014/main" id="{BFDACB4B-035D-CF43-9BF9-A62383DFB04D}"/>
+                </a:ext>
+              </a:extLst>
+            </p:cNvPr>
+            <p:cNvSpPr/>
+            <p:nvPr/>
+          </p:nvSpPr>
+          <p:spPr>
+            <a:xfrm>
+              <a:off x="4093898" y="6360347"/>
+              <a:ext cx="4003429" cy="388309"/>
+            </a:xfrm>
+            <a:prstGeom prst="rect">
+              <a:avLst/>
+            </a:prstGeom>
+            <a:solidFill>
+              <a:srgbClr val="A9D18E">
+                <a:alpha val="23529"/>
+              </a:srgbClr>
+            </a:solidFill>
+            <a:ln>
+              <a:noFill/>
+            </a:ln>
+          </p:spPr>
+          <p:style>
+            <a:lnRef idx="2">
+              <a:schemeClr val="accent1">
+                <a:shade val="50000"/>
+              </a:schemeClr>
+            </a:lnRef>
+            <a:fillRef idx="1">
+              <a:schemeClr val="accent1"/>
+            </a:fillRef>
+            <a:effectRef idx="0">
+              <a:schemeClr val="accent1"/>
+            </a:effectRef>
+            <a:fontRef idx="minor">
+              <a:schemeClr val="lt1"/>
+            </a:fontRef>
+          </p:style>
+          <p:txBody>
+            <a:bodyPr rtlCol="0" anchor="ctr"/>
+            <a:lstStyle/>
+            <a:p>
+              <a:pPr algn="ctr"/>
+              <a:endParaRPr lang="en-AU"/>
+            </a:p>
+          </p:txBody>
+        </p:sp>
+      </p:grpSp>
+    </p:spTree>
+    <p:extLst>
+      <p:ext uri="{BB962C8B-B14F-4D97-AF65-F5344CB8AC3E}">
+        <p14:creationId xmlns:p14="http://schemas.microsoft.com/office/powerpoint/2010/main" val="994715649"/>
+      </p:ext>
+    </p:extLst>
+  </p:cSld>
+  <p:clrMapOvr>
+    <a:masterClrMapping/>
+  </p:clrMapOvr>
+</p:sld>
+</file>
+
+<file path=ppt/slides/slide5.xml><?xml version="1.0" encoding="utf-8"?>
+<p:sld xmlns:a="http://schemas.openxmlformats.org/drawingml/2006/main" xmlns:r="http://schemas.openxmlformats.org/officeDocument/2006/relationships" xmlns:p="http://schemas.openxmlformats.org/presentationml/2006/main">
+  <p:cSld>
+    <p:spTree>
+      <p:nvGrpSpPr>
+        <p:cNvPr id="1" name=""/>
+        <p:cNvGrpSpPr/>
+        <p:nvPr/>
+      </p:nvGrpSpPr>
+      <p:grpSpPr>
+        <a:xfrm>
+          <a:off x="0" y="0"/>
+          <a:ext cx="0" cy="0"/>
+          <a:chOff x="0" y="0"/>
+          <a:chExt cx="0" cy="0"/>
+        </a:xfrm>
+      </p:grpSpPr>
+      <p:grpSp>
+        <p:nvGrpSpPr>
+          <p:cNvPr id="12" name="Group 11">
+            <a:extLst>
+              <a:ext uri="{FF2B5EF4-FFF2-40B4-BE49-F238E27FC236}">
+                <a16:creationId xmlns:a16="http://schemas.microsoft.com/office/drawing/2014/main" id="{40B2A040-A994-084D-8925-D1529D514026}"/>
+              </a:ext>
+            </a:extLst>
+          </p:cNvPr>
+          <p:cNvGrpSpPr/>
+          <p:nvPr/>
+        </p:nvGrpSpPr>
+        <p:grpSpPr>
+          <a:xfrm>
+            <a:off x="-2665" y="347460"/>
+            <a:ext cx="9155908" cy="4874979"/>
+            <a:chOff x="-2665" y="347460"/>
+            <a:chExt cx="9155908" cy="4874979"/>
+          </a:xfrm>
+        </p:grpSpPr>
+        <p:pic>
+          <p:nvPicPr>
+            <p:cNvPr id="11" name="Picture 10">
+              <a:extLst>
+                <a:ext uri="{FF2B5EF4-FFF2-40B4-BE49-F238E27FC236}">
+                  <a16:creationId xmlns:a16="http://schemas.microsoft.com/office/drawing/2014/main" id="{8C3443D3-B3EF-B646-81F5-FA5E6F5489EF}"/>
+                </a:ext>
+              </a:extLst>
+            </p:cNvPr>
+            <p:cNvPicPr>
+              <a:picLocks noChangeAspect="1"/>
+            </p:cNvPicPr>
+            <p:nvPr/>
+          </p:nvPicPr>
+          <p:blipFill>
+            <a:blip r:embed="rId2"/>
+            <a:stretch>
+              <a:fillRect/>
+            </a:stretch>
+          </p:blipFill>
+          <p:spPr>
+            <a:xfrm>
+              <a:off x="9243" y="347460"/>
+              <a:ext cx="9144000" cy="1287230"/>
+            </a:xfrm>
+            <a:prstGeom prst="rect">
+              <a:avLst/>
+            </a:prstGeom>
+          </p:spPr>
+        </p:pic>
+        <p:pic>
+          <p:nvPicPr>
+            <p:cNvPr id="9" name="Picture 8">
+              <a:extLst>
+                <a:ext uri="{FF2B5EF4-FFF2-40B4-BE49-F238E27FC236}">
+                  <a16:creationId xmlns:a16="http://schemas.microsoft.com/office/drawing/2014/main" id="{0A704AF5-5982-DE4D-8A04-07FBE966A521}"/>
+                </a:ext>
+              </a:extLst>
+            </p:cNvPr>
+            <p:cNvPicPr>
+              <a:picLocks noChangeAspect="1"/>
+            </p:cNvPicPr>
+            <p:nvPr/>
+          </p:nvPicPr>
+          <p:blipFill>
+            <a:blip r:embed="rId3"/>
+            <a:stretch>
+              <a:fillRect/>
+            </a:stretch>
+          </p:blipFill>
+          <p:spPr>
+            <a:xfrm>
+              <a:off x="6578" y="1552014"/>
+              <a:ext cx="9144000" cy="1287230"/>
+            </a:xfrm>
+            <a:prstGeom prst="rect">
+              <a:avLst/>
+            </a:prstGeom>
+          </p:spPr>
+        </p:pic>
+        <p:pic>
+          <p:nvPicPr>
+            <p:cNvPr id="7" name="Picture 6">
+              <a:extLst>
+                <a:ext uri="{FF2B5EF4-FFF2-40B4-BE49-F238E27FC236}">
+                  <a16:creationId xmlns:a16="http://schemas.microsoft.com/office/drawing/2014/main" id="{CD92AAD1-1E1E-5E42-A442-F5A359A4B913}"/>
+                </a:ext>
+              </a:extLst>
+            </p:cNvPr>
+            <p:cNvPicPr>
+              <a:picLocks noChangeAspect="1"/>
+            </p:cNvPicPr>
+            <p:nvPr/>
+          </p:nvPicPr>
+          <p:blipFill>
+            <a:blip r:embed="rId4"/>
+            <a:stretch>
+              <a:fillRect/>
+            </a:stretch>
+          </p:blipFill>
+          <p:spPr>
+            <a:xfrm>
+              <a:off x="-2665" y="2756568"/>
+              <a:ext cx="9144000" cy="1284419"/>
+            </a:xfrm>
+            <a:prstGeom prst="rect">
+              <a:avLst/>
+            </a:prstGeom>
+          </p:spPr>
+        </p:pic>
+        <p:pic>
+          <p:nvPicPr>
+            <p:cNvPr id="5" name="Picture 4">
+              <a:extLst>
+                <a:ext uri="{FF2B5EF4-FFF2-40B4-BE49-F238E27FC236}">
+                  <a16:creationId xmlns:a16="http://schemas.microsoft.com/office/drawing/2014/main" id="{4D9E4688-EA7F-1241-977A-BD11ED0792E7}"/>
+                </a:ext>
+              </a:extLst>
+            </p:cNvPr>
+            <p:cNvPicPr>
+              <a:picLocks noChangeAspect="1"/>
+            </p:cNvPicPr>
+            <p:nvPr/>
+          </p:nvPicPr>
+          <p:blipFill>
+            <a:blip r:embed="rId5"/>
+            <a:stretch>
+              <a:fillRect/>
+            </a:stretch>
+          </p:blipFill>
+          <p:spPr>
+            <a:xfrm>
+              <a:off x="6" y="3938020"/>
+              <a:ext cx="9144000" cy="1284419"/>
+            </a:xfrm>
+            <a:prstGeom prst="rect">
+              <a:avLst/>
+            </a:prstGeom>
+          </p:spPr>
+        </p:pic>
+      </p:grpSp>
+    </p:spTree>
+    <p:extLst>
+      <p:ext uri="{BB962C8B-B14F-4D97-AF65-F5344CB8AC3E}">
+        <p14:creationId xmlns:p14="http://schemas.microsoft.com/office/powerpoint/2010/main" val="1063337407"/>
+      </p:ext>
+    </p:extLst>
+  </p:cSld>
+  <p:clrMapOvr>
+    <a:masterClrMapping/>
+  </p:clrMapOvr>
+</p:sld>
+</file>
+
+<file path=ppt/slides/slide6.xml><?xml version="1.0" encoding="utf-8"?>
+<p:sld xmlns:a="http://schemas.openxmlformats.org/drawingml/2006/main" xmlns:r="http://schemas.openxmlformats.org/officeDocument/2006/relationships" xmlns:p="http://schemas.openxmlformats.org/presentationml/2006/main">
+  <p:cSld>
+    <p:spTree>
+      <p:nvGrpSpPr>
+        <p:cNvPr id="1" name=""/>
+        <p:cNvGrpSpPr/>
+        <p:nvPr/>
+      </p:nvGrpSpPr>
+      <p:grpSpPr>
+        <a:xfrm>
+          <a:off x="0" y="0"/>
+          <a:ext cx="0" cy="0"/>
+          <a:chOff x="0" y="0"/>
+          <a:chExt cx="0" cy="0"/>
+        </a:xfrm>
+      </p:grpSpPr>
+      <p:grpSp>
+        <p:nvGrpSpPr>
+          <p:cNvPr id="14" name="Group 13">
+            <a:extLst>
+              <a:ext uri="{FF2B5EF4-FFF2-40B4-BE49-F238E27FC236}">
+                <a16:creationId xmlns:a16="http://schemas.microsoft.com/office/drawing/2014/main" id="{E54AC37D-68F6-AC4A-BF2A-40B3A927ECC5}"/>
+              </a:ext>
+            </a:extLst>
+          </p:cNvPr>
+          <p:cNvGrpSpPr/>
+          <p:nvPr/>
+        </p:nvGrpSpPr>
+        <p:grpSpPr>
+          <a:xfrm>
+            <a:off x="900180" y="9780"/>
+            <a:ext cx="4837306" cy="4965107"/>
+            <a:chOff x="900180" y="9780"/>
+            <a:chExt cx="4837306" cy="4965107"/>
+          </a:xfrm>
+        </p:grpSpPr>
+        <p:pic>
+          <p:nvPicPr>
+            <p:cNvPr id="11" name="Picture 10">
+              <a:extLst>
+                <a:ext uri="{FF2B5EF4-FFF2-40B4-BE49-F238E27FC236}">
+                  <a16:creationId xmlns:a16="http://schemas.microsoft.com/office/drawing/2014/main" id="{F3D4FD84-C8D9-1C4D-AB19-2EC5AAEC23AD}"/>
+                </a:ext>
+              </a:extLst>
+            </p:cNvPr>
+            <p:cNvPicPr>
+              <a:picLocks noChangeAspect="1"/>
+            </p:cNvPicPr>
+            <p:nvPr/>
+          </p:nvPicPr>
+          <p:blipFill>
+            <a:blip r:embed="rId2"/>
+            <a:stretch>
+              <a:fillRect/>
+            </a:stretch>
+          </p:blipFill>
+          <p:spPr>
+            <a:xfrm>
+              <a:off x="900180" y="9780"/>
+              <a:ext cx="4837306" cy="1318644"/>
+            </a:xfrm>
+            <a:prstGeom prst="rect">
+              <a:avLst/>
+            </a:prstGeom>
+          </p:spPr>
+        </p:pic>
+        <p:pic>
+          <p:nvPicPr>
+            <p:cNvPr id="9" name="Picture 8">
+              <a:extLst>
+                <a:ext uri="{FF2B5EF4-FFF2-40B4-BE49-F238E27FC236}">
+                  <a16:creationId xmlns:a16="http://schemas.microsoft.com/office/drawing/2014/main" id="{35619378-0DE5-7442-9ACA-7EA871A2EE91}"/>
+                </a:ext>
+              </a:extLst>
+            </p:cNvPr>
+            <p:cNvPicPr>
+              <a:picLocks noChangeAspect="1"/>
+            </p:cNvPicPr>
+            <p:nvPr/>
+          </p:nvPicPr>
+          <p:blipFill>
+            <a:blip r:embed="rId3"/>
+            <a:stretch>
+              <a:fillRect/>
+            </a:stretch>
+          </p:blipFill>
+          <p:spPr>
+            <a:xfrm>
+              <a:off x="900180" y="1225268"/>
+              <a:ext cx="4837306" cy="1318644"/>
+            </a:xfrm>
+            <a:prstGeom prst="rect">
+              <a:avLst/>
+            </a:prstGeom>
+          </p:spPr>
+        </p:pic>
+        <p:pic>
+          <p:nvPicPr>
+            <p:cNvPr id="7" name="Picture 6">
+              <a:extLst>
+                <a:ext uri="{FF2B5EF4-FFF2-40B4-BE49-F238E27FC236}">
+                  <a16:creationId xmlns:a16="http://schemas.microsoft.com/office/drawing/2014/main" id="{2A012F7E-966B-A945-8670-2B1B89E37716}"/>
+                </a:ext>
+              </a:extLst>
+            </p:cNvPr>
+            <p:cNvPicPr>
+              <a:picLocks noChangeAspect="1"/>
+            </p:cNvPicPr>
+            <p:nvPr/>
+          </p:nvPicPr>
+          <p:blipFill>
+            <a:blip r:embed="rId4"/>
+            <a:stretch>
+              <a:fillRect/>
+            </a:stretch>
+          </p:blipFill>
+          <p:spPr>
+            <a:xfrm>
+              <a:off x="900180" y="2440755"/>
+              <a:ext cx="4837306" cy="1318644"/>
+            </a:xfrm>
+            <a:prstGeom prst="rect">
+              <a:avLst/>
+            </a:prstGeom>
+          </p:spPr>
+        </p:pic>
+        <p:pic>
+          <p:nvPicPr>
+            <p:cNvPr id="13" name="Picture 12">
+              <a:extLst>
+                <a:ext uri="{FF2B5EF4-FFF2-40B4-BE49-F238E27FC236}">
+                  <a16:creationId xmlns:a16="http://schemas.microsoft.com/office/drawing/2014/main" id="{93F5DDB1-9840-624E-98CD-A2C4D72E75E1}"/>
+                </a:ext>
+              </a:extLst>
+            </p:cNvPr>
+            <p:cNvPicPr>
+              <a:picLocks noChangeAspect="1"/>
+            </p:cNvPicPr>
+            <p:nvPr/>
+          </p:nvPicPr>
+          <p:blipFill>
+            <a:blip r:embed="rId5"/>
+            <a:stretch>
+              <a:fillRect/>
+            </a:stretch>
+          </p:blipFill>
+          <p:spPr>
+            <a:xfrm>
+              <a:off x="900180" y="3656243"/>
+              <a:ext cx="4837306" cy="1318644"/>
+            </a:xfrm>
+            <a:prstGeom prst="rect">
+              <a:avLst/>
+            </a:prstGeom>
+          </p:spPr>
+        </p:pic>
+      </p:grpSp>
+    </p:spTree>
+    <p:extLst>
+      <p:ext uri="{BB962C8B-B14F-4D97-AF65-F5344CB8AC3E}">
+        <p14:creationId xmlns:p14="http://schemas.microsoft.com/office/powerpoint/2010/main" val="4004959145"/>
       </p:ext>
     </p:extLst>
   </p:cSld>
@@ -3712,4 +5701,299 @@
     </a:ext>
   </a:extLst>
 </a:theme>
+</file>
+
+<file path=ppt/theme/theme2.xml><?xml version="1.0" encoding="utf-8"?>
+<a:theme xmlns:a="http://schemas.openxmlformats.org/drawingml/2006/main" name="Office Theme">
+  <a:themeElements>
+    <a:clrScheme name="Office">
+      <a:dk1>
+        <a:sysClr val="windowText" lastClr="000000"/>
+      </a:dk1>
+      <a:lt1>
+        <a:sysClr val="window" lastClr="FFFFFF"/>
+      </a:lt1>
+      <a:dk2>
+        <a:srgbClr val="44546A"/>
+      </a:dk2>
+      <a:lt2>
+        <a:srgbClr val="E7E6E6"/>
+      </a:lt2>
+      <a:accent1>
+        <a:srgbClr val="4472C4"/>
+      </a:accent1>
+      <a:accent2>
+        <a:srgbClr val="ED7D31"/>
+      </a:accent2>
+      <a:accent3>
+        <a:srgbClr val="A5A5A5"/>
+      </a:accent3>
+      <a:accent4>
+        <a:srgbClr val="FFC000"/>
+      </a:accent4>
+      <a:accent5>
+        <a:srgbClr val="5B9BD5"/>
+      </a:accent5>
+      <a:accent6>
+        <a:srgbClr val="70AD47"/>
+      </a:accent6>
+      <a:hlink>
+        <a:srgbClr val="0563C1"/>
+      </a:hlink>
+      <a:folHlink>
+        <a:srgbClr val="954F72"/>
+      </a:folHlink>
+    </a:clrScheme>
+    <a:fontScheme name="Office">
+      <a:majorFont>
+        <a:latin typeface="Calibri Light" panose="020F0302020204030204"/>
+        <a:ea typeface=""/>
+        <a:cs typeface=""/>
+        <a:font script="Jpan" typeface="游ゴシック Light"/>
+        <a:font script="Hang" typeface="맑은 고딕"/>
+        <a:font script="Hans" typeface="等线 Light"/>
+        <a:font script="Hant" typeface="新細明體"/>
+        <a:font script="Arab" typeface="Times New Roman"/>
+        <a:font script="Hebr" typeface="Times New Roman"/>
+        <a:font script="Thai" typeface="Angsana New"/>
+        <a:font script="Ethi" typeface="Nyala"/>
+        <a:font script="Beng" typeface="Vrinda"/>
+        <a:font script="Gujr" typeface="Shruti"/>
+        <a:font script="Khmr" typeface="MoolBoran"/>
+        <a:font script="Knda" typeface="Tunga"/>
+        <a:font script="Guru" typeface="Raavi"/>
+        <a:font script="Cans" typeface="Euphemia"/>
+        <a:font script="Cher" typeface="Plantagenet Cherokee"/>
+        <a:font script="Yiii" typeface="Microsoft Yi Baiti"/>
+        <a:font script="Tibt" typeface="Microsoft Himalaya"/>
+        <a:font script="Thaa" typeface="MV Boli"/>
+        <a:font script="Deva" typeface="Mangal"/>
+        <a:font script="Telu" typeface="Gautami"/>
+        <a:font script="Taml" typeface="Latha"/>
+        <a:font script="Syrc" typeface="Estrangelo Edessa"/>
+        <a:font script="Orya" typeface="Kalinga"/>
+        <a:font script="Mlym" typeface="Kartika"/>
+        <a:font script="Laoo" typeface="DokChampa"/>
+        <a:font script="Sinh" typeface="Iskoola Pota"/>
+        <a:font script="Mong" typeface="Mongolian Baiti"/>
+        <a:font script="Viet" typeface="Times New Roman"/>
+        <a:font script="Uigh" typeface="Microsoft Uighur"/>
+        <a:font script="Geor" typeface="Sylfaen"/>
+        <a:font script="Armn" typeface="Arial"/>
+        <a:font script="Bugi" typeface="Leelawadee UI"/>
+        <a:font script="Bopo" typeface="Microsoft JhengHei"/>
+        <a:font script="Java" typeface="Javanese Text"/>
+        <a:font script="Lisu" typeface="Segoe UI"/>
+        <a:font script="Mymr" typeface="Myanmar Text"/>
+        <a:font script="Nkoo" typeface="Ebrima"/>
+        <a:font script="Olck" typeface="Nirmala UI"/>
+        <a:font script="Osma" typeface="Ebrima"/>
+        <a:font script="Phag" typeface="Phagspa"/>
+        <a:font script="Syrn" typeface="Estrangelo Edessa"/>
+        <a:font script="Syrj" typeface="Estrangelo Edessa"/>
+        <a:font script="Syre" typeface="Estrangelo Edessa"/>
+        <a:font script="Sora" typeface="Nirmala UI"/>
+        <a:font script="Tale" typeface="Microsoft Tai Le"/>
+        <a:font script="Talu" typeface="Microsoft New Tai Lue"/>
+        <a:font script="Tfng" typeface="Ebrima"/>
+      </a:majorFont>
+      <a:minorFont>
+        <a:latin typeface="Calibri" panose="020F0502020204030204"/>
+        <a:ea typeface=""/>
+        <a:cs typeface=""/>
+        <a:font script="Jpan" typeface="游ゴシック"/>
+        <a:font script="Hang" typeface="맑은 고딕"/>
+        <a:font script="Hans" typeface="等线"/>
+        <a:font script="Hant" typeface="新細明體"/>
+        <a:font script="Arab" typeface="Arial"/>
+        <a:font script="Hebr" typeface="Arial"/>
+        <a:font script="Thai" typeface="Cordia New"/>
+        <a:font script="Ethi" typeface="Nyala"/>
+        <a:font script="Beng" typeface="Vrinda"/>
+        <a:font script="Gujr" typeface="Shruti"/>
+        <a:font script="Khmr" typeface="DaunPenh"/>
+        <a:font script="Knda" typeface="Tunga"/>
+        <a:font script="Guru" typeface="Raavi"/>
+        <a:font script="Cans" typeface="Euphemia"/>
+        <a:font script="Cher" typeface="Plantagenet Cherokee"/>
+        <a:font script="Yiii" typeface="Microsoft Yi Baiti"/>
+        <a:font script="Tibt" typeface="Microsoft Himalaya"/>
+        <a:font script="Thaa" typeface="MV Boli"/>
+        <a:font script="Deva" typeface="Mangal"/>
+        <a:font script="Telu" typeface="Gautami"/>
+        <a:font script="Taml" typeface="Latha"/>
+        <a:font script="Syrc" typeface="Estrangelo Edessa"/>
+        <a:font script="Orya" typeface="Kalinga"/>
+        <a:font script="Mlym" typeface="Kartika"/>
+        <a:font script="Laoo" typeface="DokChampa"/>
+        <a:font script="Sinh" typeface="Iskoola Pota"/>
+        <a:font script="Mong" typeface="Mongolian Baiti"/>
+        <a:font script="Viet" typeface="Arial"/>
+        <a:font script="Uigh" typeface="Microsoft Uighur"/>
+        <a:font script="Geor" typeface="Sylfaen"/>
+        <a:font script="Armn" typeface="Arial"/>
+        <a:font script="Bugi" typeface="Leelawadee UI"/>
+        <a:font script="Bopo" typeface="Microsoft JhengHei"/>
+        <a:font script="Java" typeface="Javanese Text"/>
+        <a:font script="Lisu" typeface="Segoe UI"/>
+        <a:font script="Mymr" typeface="Myanmar Text"/>
+        <a:font script="Nkoo" typeface="Ebrima"/>
+        <a:font script="Olck" typeface="Nirmala UI"/>
+        <a:font script="Osma" typeface="Ebrima"/>
+        <a:font script="Phag" typeface="Phagspa"/>
+        <a:font script="Syrn" typeface="Estrangelo Edessa"/>
+        <a:font script="Syrj" typeface="Estrangelo Edessa"/>
+        <a:font script="Syre" typeface="Estrangelo Edessa"/>
+        <a:font script="Sora" typeface="Nirmala UI"/>
+        <a:font script="Tale" typeface="Microsoft Tai Le"/>
+        <a:font script="Talu" typeface="Microsoft New Tai Lue"/>
+        <a:font script="Tfng" typeface="Ebrima"/>
+      </a:minorFont>
+    </a:fontScheme>
+    <a:fmtScheme name="Office">
+      <a:fillStyleLst>
+        <a:solidFill>
+          <a:schemeClr val="phClr"/>
+        </a:solidFill>
+        <a:gradFill rotWithShape="1">
+          <a:gsLst>
+            <a:gs pos="0">
+              <a:schemeClr val="phClr">
+                <a:lumMod val="110000"/>
+                <a:satMod val="105000"/>
+                <a:tint val="67000"/>
+              </a:schemeClr>
+            </a:gs>
+            <a:gs pos="50000">
+              <a:schemeClr val="phClr">
+                <a:lumMod val="105000"/>
+                <a:satMod val="103000"/>
+                <a:tint val="73000"/>
+              </a:schemeClr>
+            </a:gs>
+            <a:gs pos="100000">
+              <a:schemeClr val="phClr">
+                <a:lumMod val="105000"/>
+                <a:satMod val="109000"/>
+                <a:tint val="81000"/>
+              </a:schemeClr>
+            </a:gs>
+          </a:gsLst>
+          <a:lin ang="5400000" scaled="0"/>
+        </a:gradFill>
+        <a:gradFill rotWithShape="1">
+          <a:gsLst>
+            <a:gs pos="0">
+              <a:schemeClr val="phClr">
+                <a:satMod val="103000"/>
+                <a:lumMod val="102000"/>
+                <a:tint val="94000"/>
+              </a:schemeClr>
+            </a:gs>
+            <a:gs pos="50000">
+              <a:schemeClr val="phClr">
+                <a:satMod val="110000"/>
+                <a:lumMod val="100000"/>
+                <a:shade val="100000"/>
+              </a:schemeClr>
+            </a:gs>
+            <a:gs pos="100000">
+              <a:schemeClr val="phClr">
+                <a:lumMod val="99000"/>
+                <a:satMod val="120000"/>
+                <a:shade val="78000"/>
+              </a:schemeClr>
+            </a:gs>
+          </a:gsLst>
+          <a:lin ang="5400000" scaled="0"/>
+        </a:gradFill>
+      </a:fillStyleLst>
+      <a:lnStyleLst>
+        <a:ln w="6350" cap="flat" cmpd="sng" algn="ctr">
+          <a:solidFill>
+            <a:schemeClr val="phClr"/>
+          </a:solidFill>
+          <a:prstDash val="solid"/>
+          <a:miter lim="800000"/>
+        </a:ln>
+        <a:ln w="12700" cap="flat" cmpd="sng" algn="ctr">
+          <a:solidFill>
+            <a:schemeClr val="phClr"/>
+          </a:solidFill>
+          <a:prstDash val="solid"/>
+          <a:miter lim="800000"/>
+        </a:ln>
+        <a:ln w="19050" cap="flat" cmpd="sng" algn="ctr">
+          <a:solidFill>
+            <a:schemeClr val="phClr"/>
+          </a:solidFill>
+          <a:prstDash val="solid"/>
+          <a:miter lim="800000"/>
+        </a:ln>
+      </a:lnStyleLst>
+      <a:effectStyleLst>
+        <a:effectStyle>
+          <a:effectLst/>
+        </a:effectStyle>
+        <a:effectStyle>
+          <a:effectLst/>
+        </a:effectStyle>
+        <a:effectStyle>
+          <a:effectLst>
+            <a:outerShdw blurRad="57150" dist="19050" dir="5400000" algn="ctr" rotWithShape="0">
+              <a:srgbClr val="000000">
+                <a:alpha val="63000"/>
+              </a:srgbClr>
+            </a:outerShdw>
+          </a:effectLst>
+        </a:effectStyle>
+      </a:effectStyleLst>
+      <a:bgFillStyleLst>
+        <a:solidFill>
+          <a:schemeClr val="phClr"/>
+        </a:solidFill>
+        <a:solidFill>
+          <a:schemeClr val="phClr">
+            <a:tint val="95000"/>
+            <a:satMod val="170000"/>
+          </a:schemeClr>
+        </a:solidFill>
+        <a:gradFill rotWithShape="1">
+          <a:gsLst>
+            <a:gs pos="0">
+              <a:schemeClr val="phClr">
+                <a:tint val="93000"/>
+                <a:satMod val="150000"/>
+                <a:shade val="98000"/>
+                <a:lumMod val="102000"/>
+              </a:schemeClr>
+            </a:gs>
+            <a:gs pos="50000">
+              <a:schemeClr val="phClr">
+                <a:tint val="98000"/>
+                <a:satMod val="130000"/>
+                <a:shade val="90000"/>
+                <a:lumMod val="103000"/>
+              </a:schemeClr>
+            </a:gs>
+            <a:gs pos="100000">
+              <a:schemeClr val="phClr">
+                <a:shade val="63000"/>
+                <a:satMod val="120000"/>
+              </a:schemeClr>
+            </a:gs>
+          </a:gsLst>
+          <a:lin ang="5400000" scaled="0"/>
+        </a:gradFill>
+      </a:bgFillStyleLst>
+    </a:fmtScheme>
+  </a:themeElements>
+  <a:objectDefaults/>
+  <a:extraClrSchemeLst/>
+  <a:extLst>
+    <a:ext uri="{05A4C25C-085E-4340-85A3-A5531E510DB2}">
+      <thm15:themeFamily xmlns:thm15="http://schemas.microsoft.com/office/thememl/2012/main" name="Office Theme" id="{62F939B6-93AF-4DB8-9C6B-D6C7DFDC589F}" vid="{4A3C46E8-61CC-4603-A589-7422A47A8E4A}"/>
+    </a:ext>
+  </a:extLst>
+</a:theme>
 </file>
</xml_diff>

<commit_message>
Update to supply missing Fig S2 as well as paragraph on Caveats. Altered ...j-n-j notebook to plot only countries with minimum count of confirmed cases.
</commit_message>
<xml_diff>
--- a/Notebooks/covid-19-caution/figures/Assembled_figs.pptx
+++ b/Notebooks/covid-19-caution/figures/Assembled_figs.pptx
@@ -5,15 +5,16 @@
     <p:sldMasterId id="2147483672" r:id="rId1"/>
   </p:sldMasterIdLst>
   <p:notesMasterIdLst>
-    <p:notesMasterId r:id="rId8"/>
+    <p:notesMasterId r:id="rId9"/>
   </p:notesMasterIdLst>
   <p:sldIdLst>
     <p:sldId id="256" r:id="rId2"/>
     <p:sldId id="257" r:id="rId3"/>
     <p:sldId id="261" r:id="rId4"/>
     <p:sldId id="258" r:id="rId5"/>
-    <p:sldId id="259" r:id="rId6"/>
-    <p:sldId id="260" r:id="rId7"/>
+    <p:sldId id="262" r:id="rId6"/>
+    <p:sldId id="259" r:id="rId7"/>
+    <p:sldId id="260" r:id="rId8"/>
   </p:sldIdLst>
   <p:sldSz cx="9144000" cy="6858000" type="screen4x3"/>
   <p:notesSz cx="6858000" cy="9144000"/>
@@ -116,6 +117,9 @@
     <p:ext uri="{EFAFB233-063F-42B5-8137-9DF3F51BA10A}">
       <p15:sldGuideLst xmlns:p15="http://schemas.microsoft.com/office/powerpoint/2012/main"/>
     </p:ext>
+    <p:ext uri="{2D200454-40CA-4A62-9FC3-DE9A4176ACB9}">
+      <p15:notesGuideLst xmlns:p15="http://schemas.microsoft.com/office/powerpoint/2012/main"/>
+    </p:ext>
   </p:extLst>
 </p:presentation>
 </file>
@@ -202,7 +206,7 @@
           <a:p>
             <a:fld id="{DFFD465C-9FD1-214C-B301-A94B1CF6E8E8}" type="datetimeFigureOut">
               <a:rPr lang="en-AU" smtClean="0"/>
-              <a:t>25/8/20</a:t>
+              <a:t>26/8/20</a:t>
             </a:fld>
             <a:endParaRPr lang="en-AU"/>
           </a:p>
@@ -710,7 +714,7 @@
           <a:p>
             <a:fld id="{424F0358-0D26-BB46-82E3-4755F78A335E}" type="datetimeFigureOut">
               <a:rPr lang="en-AU" smtClean="0"/>
-              <a:t>25/8/20</a:t>
+              <a:t>26/8/20</a:t>
             </a:fld>
             <a:endParaRPr lang="en-AU"/>
           </a:p>
@@ -880,7 +884,7 @@
           <a:p>
             <a:fld id="{424F0358-0D26-BB46-82E3-4755F78A335E}" type="datetimeFigureOut">
               <a:rPr lang="en-AU" smtClean="0"/>
-              <a:t>25/8/20</a:t>
+              <a:t>26/8/20</a:t>
             </a:fld>
             <a:endParaRPr lang="en-AU"/>
           </a:p>
@@ -1060,7 +1064,7 @@
           <a:p>
             <a:fld id="{424F0358-0D26-BB46-82E3-4755F78A335E}" type="datetimeFigureOut">
               <a:rPr lang="en-AU" smtClean="0"/>
-              <a:t>25/8/20</a:t>
+              <a:t>26/8/20</a:t>
             </a:fld>
             <a:endParaRPr lang="en-AU"/>
           </a:p>
@@ -1230,7 +1234,7 @@
           <a:p>
             <a:fld id="{424F0358-0D26-BB46-82E3-4755F78A335E}" type="datetimeFigureOut">
               <a:rPr lang="en-AU" smtClean="0"/>
-              <a:t>25/8/20</a:t>
+              <a:t>26/8/20</a:t>
             </a:fld>
             <a:endParaRPr lang="en-AU"/>
           </a:p>
@@ -1474,7 +1478,7 @@
           <a:p>
             <a:fld id="{424F0358-0D26-BB46-82E3-4755F78A335E}" type="datetimeFigureOut">
               <a:rPr lang="en-AU" smtClean="0"/>
-              <a:t>25/8/20</a:t>
+              <a:t>26/8/20</a:t>
             </a:fld>
             <a:endParaRPr lang="en-AU"/>
           </a:p>
@@ -1706,7 +1710,7 @@
           <a:p>
             <a:fld id="{424F0358-0D26-BB46-82E3-4755F78A335E}" type="datetimeFigureOut">
               <a:rPr lang="en-AU" smtClean="0"/>
-              <a:t>25/8/20</a:t>
+              <a:t>26/8/20</a:t>
             </a:fld>
             <a:endParaRPr lang="en-AU"/>
           </a:p>
@@ -2073,7 +2077,7 @@
           <a:p>
             <a:fld id="{424F0358-0D26-BB46-82E3-4755F78A335E}" type="datetimeFigureOut">
               <a:rPr lang="en-AU" smtClean="0"/>
-              <a:t>25/8/20</a:t>
+              <a:t>26/8/20</a:t>
             </a:fld>
             <a:endParaRPr lang="en-AU"/>
           </a:p>
@@ -2191,7 +2195,7 @@
           <a:p>
             <a:fld id="{424F0358-0D26-BB46-82E3-4755F78A335E}" type="datetimeFigureOut">
               <a:rPr lang="en-AU" smtClean="0"/>
-              <a:t>25/8/20</a:t>
+              <a:t>26/8/20</a:t>
             </a:fld>
             <a:endParaRPr lang="en-AU"/>
           </a:p>
@@ -2286,7 +2290,7 @@
           <a:p>
             <a:fld id="{424F0358-0D26-BB46-82E3-4755F78A335E}" type="datetimeFigureOut">
               <a:rPr lang="en-AU" smtClean="0"/>
-              <a:t>25/8/20</a:t>
+              <a:t>26/8/20</a:t>
             </a:fld>
             <a:endParaRPr lang="en-AU"/>
           </a:p>
@@ -2563,7 +2567,7 @@
           <a:p>
             <a:fld id="{424F0358-0D26-BB46-82E3-4755F78A335E}" type="datetimeFigureOut">
               <a:rPr lang="en-AU" smtClean="0"/>
-              <a:t>25/8/20</a:t>
+              <a:t>26/8/20</a:t>
             </a:fld>
             <a:endParaRPr lang="en-AU"/>
           </a:p>
@@ -2820,7 +2824,7 @@
           <a:p>
             <a:fld id="{424F0358-0D26-BB46-82E3-4755F78A335E}" type="datetimeFigureOut">
               <a:rPr lang="en-AU" smtClean="0"/>
-              <a:t>25/8/20</a:t>
+              <a:t>26/8/20</a:t>
             </a:fld>
             <a:endParaRPr lang="en-AU"/>
           </a:p>
@@ -3033,7 +3037,7 @@
           <a:p>
             <a:fld id="{424F0358-0D26-BB46-82E3-4755F78A335E}" type="datetimeFigureOut">
               <a:rPr lang="en-AU" smtClean="0"/>
-              <a:t>25/8/20</a:t>
+              <a:t>26/8/20</a:t>
             </a:fld>
             <a:endParaRPr lang="en-AU"/>
           </a:p>
@@ -4483,7 +4487,7 @@
             <p:nvPr/>
           </p:nvPicPr>
           <p:blipFill>
-            <a:blip r:embed="rId3"/>
+            <a:blip r:embed="rId2"/>
             <a:stretch>
               <a:fillRect/>
             </a:stretch>
@@ -4696,7 +4700,7 @@
             <p:nvPr/>
           </p:nvPicPr>
           <p:blipFill>
-            <a:blip r:embed="rId4"/>
+            <a:blip r:embed="rId3"/>
             <a:stretch>
               <a:fillRect/>
             </a:stretch>
@@ -4909,7 +4913,7 @@
             <p:nvPr/>
           </p:nvPicPr>
           <p:blipFill>
-            <a:blip r:embed="rId5"/>
+            <a:blip r:embed="rId4"/>
             <a:stretch>
               <a:fillRect/>
             </a:stretch>
@@ -5117,6 +5121,83 @@
           <a:chExt cx="0" cy="0"/>
         </a:xfrm>
       </p:grpSpPr>
+      <p:pic>
+        <p:nvPicPr>
+          <p:cNvPr id="2052" name="Picture 4">
+            <a:extLst>
+              <a:ext uri="{FF2B5EF4-FFF2-40B4-BE49-F238E27FC236}">
+                <a16:creationId xmlns:a16="http://schemas.microsoft.com/office/drawing/2014/main" id="{19724CEF-CD17-084C-84A8-2F467F767777}"/>
+              </a:ext>
+            </a:extLst>
+          </p:cNvPr>
+          <p:cNvPicPr>
+            <a:picLocks noChangeAspect="1" noChangeArrowheads="1"/>
+          </p:cNvPicPr>
+          <p:nvPr/>
+        </p:nvPicPr>
+        <p:blipFill>
+          <a:blip r:embed="rId2">
+            <a:extLst>
+              <a:ext uri="{28A0092B-C50C-407E-A947-70E740481C1C}">
+                <a14:useLocalDpi xmlns:a14="http://schemas.microsoft.com/office/drawing/2010/main" val="0"/>
+              </a:ext>
+            </a:extLst>
+          </a:blip>
+          <a:srcRect/>
+          <a:stretch>
+            <a:fillRect/>
+          </a:stretch>
+        </p:blipFill>
+        <p:spPr bwMode="auto">
+          <a:xfrm>
+            <a:off x="2174875" y="0"/>
+            <a:ext cx="4792663" cy="6858000"/>
+          </a:xfrm>
+          <a:prstGeom prst="rect">
+            <a:avLst/>
+          </a:prstGeom>
+          <a:noFill/>
+          <a:extLst>
+            <a:ext uri="{909E8E84-426E-40DD-AFC4-6F175D3DCCD1}">
+              <a14:hiddenFill xmlns:a14="http://schemas.microsoft.com/office/drawing/2010/main">
+                <a:solidFill>
+                  <a:srgbClr val="FFFFFF"/>
+                </a:solidFill>
+              </a14:hiddenFill>
+            </a:ext>
+          </a:extLst>
+        </p:spPr>
+      </p:pic>
+    </p:spTree>
+    <p:extLst>
+      <p:ext uri="{BB962C8B-B14F-4D97-AF65-F5344CB8AC3E}">
+        <p14:creationId xmlns:p14="http://schemas.microsoft.com/office/powerpoint/2010/main" val="3495166933"/>
+      </p:ext>
+    </p:extLst>
+  </p:cSld>
+  <p:clrMapOvr>
+    <a:masterClrMapping/>
+  </p:clrMapOvr>
+</p:sld>
+</file>
+
+<file path=ppt/slides/slide6.xml><?xml version="1.0" encoding="utf-8"?>
+<p:sld xmlns:a="http://schemas.openxmlformats.org/drawingml/2006/main" xmlns:r="http://schemas.openxmlformats.org/officeDocument/2006/relationships" xmlns:p="http://schemas.openxmlformats.org/presentationml/2006/main">
+  <p:cSld>
+    <p:spTree>
+      <p:nvGrpSpPr>
+        <p:cNvPr id="1" name=""/>
+        <p:cNvGrpSpPr/>
+        <p:nvPr/>
+      </p:nvGrpSpPr>
+      <p:grpSpPr>
+        <a:xfrm>
+          <a:off x="0" y="0"/>
+          <a:ext cx="0" cy="0"/>
+          <a:chOff x="0" y="0"/>
+          <a:chExt cx="0" cy="0"/>
+        </a:xfrm>
+      </p:grpSpPr>
       <p:grpSp>
         <p:nvGrpSpPr>
           <p:cNvPr id="12" name="Group 11">
@@ -5271,7 +5352,7 @@
 </p:sld>
 </file>
 
-<file path=ppt/slides/slide6.xml><?xml version="1.0" encoding="utf-8"?>
+<file path=ppt/slides/slide7.xml><?xml version="1.0" encoding="utf-8"?>
 <p:sld xmlns:a="http://schemas.openxmlformats.org/drawingml/2006/main" xmlns:r="http://schemas.openxmlformats.org/officeDocument/2006/relationships" xmlns:p="http://schemas.openxmlformats.org/presentationml/2006/main">
   <p:cSld>
     <p:spTree>

</xml_diff>

<commit_message>
Update to doc discussion plus  work on getting testing data and OWID data into same format as JHU in notebook ...j-n-j
</commit_message>
<xml_diff>
--- a/Notebooks/covid-19-caution/figures/Assembled_figs.pptx
+++ b/Notebooks/covid-19-caution/figures/Assembled_figs.pptx
@@ -5,7 +5,7 @@
     <p:sldMasterId id="2147483672" r:id="rId1"/>
   </p:sldMasterIdLst>
   <p:notesMasterIdLst>
-    <p:notesMasterId r:id="rId9"/>
+    <p:notesMasterId r:id="rId10"/>
   </p:notesMasterIdLst>
   <p:sldIdLst>
     <p:sldId id="256" r:id="rId2"/>
@@ -15,6 +15,7 @@
     <p:sldId id="262" r:id="rId6"/>
     <p:sldId id="259" r:id="rId7"/>
     <p:sldId id="260" r:id="rId8"/>
+    <p:sldId id="263" r:id="rId9"/>
   </p:sldIdLst>
   <p:sldSz cx="9144000" cy="6858000" type="screen4x3"/>
   <p:notesSz cx="6858000" cy="9144000"/>
@@ -574,6 +575,127 @@
     <p:extLst>
       <p:ext uri="{BB962C8B-B14F-4D97-AF65-F5344CB8AC3E}">
         <p14:creationId xmlns:p14="http://schemas.microsoft.com/office/powerpoint/2010/main" val="3333930563"/>
+      </p:ext>
+    </p:extLst>
+  </p:cSld>
+  <p:clrMapOvr>
+    <a:masterClrMapping/>
+  </p:clrMapOvr>
+</p:notes>
+</file>
+
+<file path=ppt/notesSlides/notesSlide2.xml><?xml version="1.0" encoding="utf-8"?>
+<p:notes xmlns:a="http://schemas.openxmlformats.org/drawingml/2006/main" xmlns:r="http://schemas.openxmlformats.org/officeDocument/2006/relationships" xmlns:p="http://schemas.openxmlformats.org/presentationml/2006/main">
+  <p:cSld>
+    <p:spTree>
+      <p:nvGrpSpPr>
+        <p:cNvPr id="1" name=""/>
+        <p:cNvGrpSpPr/>
+        <p:nvPr/>
+      </p:nvGrpSpPr>
+      <p:grpSpPr>
+        <a:xfrm>
+          <a:off x="0" y="0"/>
+          <a:ext cx="0" cy="0"/>
+          <a:chOff x="0" y="0"/>
+          <a:chExt cx="0" cy="0"/>
+        </a:xfrm>
+      </p:grpSpPr>
+      <p:sp>
+        <p:nvSpPr>
+          <p:cNvPr id="2" name="Slide Image Placeholder 1"/>
+          <p:cNvSpPr>
+            <a:spLocks noGrp="1" noRot="1" noChangeAspect="1"/>
+          </p:cNvSpPr>
+          <p:nvPr>
+            <p:ph type="sldImg"/>
+          </p:nvPr>
+        </p:nvSpPr>
+        <p:spPr/>
+      </p:sp>
+      <p:sp>
+        <p:nvSpPr>
+          <p:cNvPr id="3" name="Notes Placeholder 2"/>
+          <p:cNvSpPr>
+            <a:spLocks noGrp="1"/>
+          </p:cNvSpPr>
+          <p:nvPr>
+            <p:ph type="body" idx="1"/>
+          </p:nvPr>
+        </p:nvSpPr>
+        <p:spPr/>
+        <p:txBody>
+          <a:bodyPr/>
+          <a:lstStyle/>
+          <a:p>
+            <a:r>
+              <a:rPr lang="en-AU" dirty="0" err="1"/>
+              <a:t>CautionFactor</a:t>
+            </a:r>
+            <a:r>
+              <a:rPr lang="en-AU" dirty="0"/>
+              <a:t>= 0.2    # Fractional reduction of exposure rate for cautioned individuals</a:t>
+            </a:r>
+          </a:p>
+          <a:p>
+            <a:r>
+              <a:rPr lang="en-AU" dirty="0" err="1"/>
+              <a:t>CautionRetention</a:t>
+            </a:r>
+            <a:r>
+              <a:rPr lang="en-AU" dirty="0"/>
+              <a:t>= 60. # Duration of cautionary state of susceptibles (4 weeks)</a:t>
+            </a:r>
+          </a:p>
+          <a:p>
+            <a:r>
+              <a:rPr lang="en-AU" dirty="0" err="1"/>
+              <a:t>CautionICUFrac</a:t>
+            </a:r>
+            <a:r>
+              <a:rPr lang="en-AU" dirty="0"/>
+              <a:t>= 0.3   # Fraction of ICUs occupied leading to transition to caution @ 1/day </a:t>
+            </a:r>
+          </a:p>
+          <a:p>
+            <a:r>
+              <a:rPr lang="en-AU" dirty="0" err="1"/>
+              <a:t>ICUFrac</a:t>
+            </a:r>
+            <a:r>
+              <a:rPr lang="en-AU" dirty="0"/>
+              <a:t>= 0.002        # Fraction of ICUs relative to population size N</a:t>
+            </a:r>
+          </a:p>
+        </p:txBody>
+      </p:sp>
+      <p:sp>
+        <p:nvSpPr>
+          <p:cNvPr id="4" name="Slide Number Placeholder 3"/>
+          <p:cNvSpPr>
+            <a:spLocks noGrp="1"/>
+          </p:cNvSpPr>
+          <p:nvPr>
+            <p:ph type="sldNum" sz="quarter" idx="5"/>
+          </p:nvPr>
+        </p:nvSpPr>
+        <p:spPr/>
+        <p:txBody>
+          <a:bodyPr/>
+          <a:lstStyle/>
+          <a:p>
+            <a:fld id="{9BD02877-8FC9-544F-B217-965B98AF8DEF}" type="slidenum">
+              <a:rPr lang="en-AU" smtClean="0"/>
+              <a:t>8</a:t>
+            </a:fld>
+            <a:endParaRPr lang="en-AU"/>
+          </a:p>
+        </p:txBody>
+      </p:sp>
+    </p:spTree>
+    <p:extLst>
+      <p:ext uri="{BB962C8B-B14F-4D97-AF65-F5344CB8AC3E}">
+        <p14:creationId xmlns:p14="http://schemas.microsoft.com/office/powerpoint/2010/main" val="1882902208"/>
       </p:ext>
     </p:extLst>
   </p:cSld>
@@ -5150,7 +5272,7 @@
         </p:blipFill>
         <p:spPr bwMode="auto">
           <a:xfrm>
-            <a:off x="2174875" y="0"/>
+            <a:off x="2175668" y="-107373"/>
             <a:ext cx="4792663" cy="6858000"/>
           </a:xfrm>
           <a:prstGeom prst="rect">
@@ -5514,6 +5636,177 @@
     <p:extLst>
       <p:ext uri="{BB962C8B-B14F-4D97-AF65-F5344CB8AC3E}">
         <p14:creationId xmlns:p14="http://schemas.microsoft.com/office/powerpoint/2010/main" val="4004959145"/>
+      </p:ext>
+    </p:extLst>
+  </p:cSld>
+  <p:clrMapOvr>
+    <a:masterClrMapping/>
+  </p:clrMapOvr>
+</p:sld>
+</file>
+
+<file path=ppt/slides/slide8.xml><?xml version="1.0" encoding="utf-8"?>
+<p:sld xmlns:a="http://schemas.openxmlformats.org/drawingml/2006/main" xmlns:r="http://schemas.openxmlformats.org/officeDocument/2006/relationships" xmlns:p="http://schemas.openxmlformats.org/presentationml/2006/main">
+  <p:cSld>
+    <p:spTree>
+      <p:nvGrpSpPr>
+        <p:cNvPr id="1" name=""/>
+        <p:cNvGrpSpPr/>
+        <p:nvPr/>
+      </p:nvGrpSpPr>
+      <p:grpSpPr>
+        <a:xfrm>
+          <a:off x="0" y="0"/>
+          <a:ext cx="0" cy="0"/>
+          <a:chOff x="0" y="0"/>
+          <a:chExt cx="0" cy="0"/>
+        </a:xfrm>
+      </p:grpSpPr>
+      <p:grpSp>
+        <p:nvGrpSpPr>
+          <p:cNvPr id="13" name="Group 12">
+            <a:extLst>
+              <a:ext uri="{FF2B5EF4-FFF2-40B4-BE49-F238E27FC236}">
+                <a16:creationId xmlns:a16="http://schemas.microsoft.com/office/drawing/2014/main" id="{D323326D-010F-114A-8D1D-CFE7BF706B43}"/>
+              </a:ext>
+            </a:extLst>
+          </p:cNvPr>
+          <p:cNvGrpSpPr/>
+          <p:nvPr/>
+        </p:nvGrpSpPr>
+        <p:grpSpPr>
+          <a:xfrm>
+            <a:off x="998082" y="255238"/>
+            <a:ext cx="6749379" cy="6602762"/>
+            <a:chOff x="58745" y="188736"/>
+            <a:chExt cx="6080112" cy="6187320"/>
+          </a:xfrm>
+        </p:grpSpPr>
+        <p:pic>
+          <p:nvPicPr>
+            <p:cNvPr id="12" name="Picture 11">
+              <a:extLst>
+                <a:ext uri="{FF2B5EF4-FFF2-40B4-BE49-F238E27FC236}">
+                  <a16:creationId xmlns:a16="http://schemas.microsoft.com/office/drawing/2014/main" id="{663CFEF9-9430-6641-80C4-C1F42C70BAC9}"/>
+                </a:ext>
+              </a:extLst>
+            </p:cNvPr>
+            <p:cNvPicPr>
+              <a:picLocks noChangeAspect="1"/>
+            </p:cNvPicPr>
+            <p:nvPr/>
+          </p:nvPicPr>
+          <p:blipFill>
+            <a:blip r:embed="rId3"/>
+            <a:stretch>
+              <a:fillRect/>
+            </a:stretch>
+          </p:blipFill>
+          <p:spPr>
+            <a:xfrm>
+              <a:off x="58745" y="188736"/>
+              <a:ext cx="6080111" cy="1657431"/>
+            </a:xfrm>
+            <a:prstGeom prst="rect">
+              <a:avLst/>
+            </a:prstGeom>
+          </p:spPr>
+        </p:pic>
+        <p:pic>
+          <p:nvPicPr>
+            <p:cNvPr id="10" name="Picture 9">
+              <a:extLst>
+                <a:ext uri="{FF2B5EF4-FFF2-40B4-BE49-F238E27FC236}">
+                  <a16:creationId xmlns:a16="http://schemas.microsoft.com/office/drawing/2014/main" id="{44A83BAA-D9C7-CA49-9599-7BDFEAD2ED25}"/>
+                </a:ext>
+              </a:extLst>
+            </p:cNvPr>
+            <p:cNvPicPr>
+              <a:picLocks noChangeAspect="1"/>
+            </p:cNvPicPr>
+            <p:nvPr/>
+          </p:nvPicPr>
+          <p:blipFill>
+            <a:blip r:embed="rId4"/>
+            <a:stretch>
+              <a:fillRect/>
+            </a:stretch>
+          </p:blipFill>
+          <p:spPr>
+            <a:xfrm>
+              <a:off x="104559" y="1710399"/>
+              <a:ext cx="6034298" cy="1644942"/>
+            </a:xfrm>
+            <a:prstGeom prst="rect">
+              <a:avLst/>
+            </a:prstGeom>
+          </p:spPr>
+        </p:pic>
+        <p:pic>
+          <p:nvPicPr>
+            <p:cNvPr id="8" name="Picture 7">
+              <a:extLst>
+                <a:ext uri="{FF2B5EF4-FFF2-40B4-BE49-F238E27FC236}">
+                  <a16:creationId xmlns:a16="http://schemas.microsoft.com/office/drawing/2014/main" id="{C508CCB3-8066-D441-96C3-B260FAAEB13D}"/>
+                </a:ext>
+              </a:extLst>
+            </p:cNvPr>
+            <p:cNvPicPr>
+              <a:picLocks noChangeAspect="1"/>
+            </p:cNvPicPr>
+            <p:nvPr/>
+          </p:nvPicPr>
+          <p:blipFill>
+            <a:blip r:embed="rId5"/>
+            <a:stretch>
+              <a:fillRect/>
+            </a:stretch>
+          </p:blipFill>
+          <p:spPr>
+            <a:xfrm>
+              <a:off x="104559" y="3217928"/>
+              <a:ext cx="6034298" cy="1644942"/>
+            </a:xfrm>
+            <a:prstGeom prst="rect">
+              <a:avLst/>
+            </a:prstGeom>
+          </p:spPr>
+        </p:pic>
+        <p:pic>
+          <p:nvPicPr>
+            <p:cNvPr id="6" name="Picture 5">
+              <a:extLst>
+                <a:ext uri="{FF2B5EF4-FFF2-40B4-BE49-F238E27FC236}">
+                  <a16:creationId xmlns:a16="http://schemas.microsoft.com/office/drawing/2014/main" id="{D2A8A7D1-A718-1D44-B4F0-2A4EABFA9959}"/>
+                </a:ext>
+              </a:extLst>
+            </p:cNvPr>
+            <p:cNvPicPr>
+              <a:picLocks noChangeAspect="1"/>
+            </p:cNvPicPr>
+            <p:nvPr/>
+          </p:nvPicPr>
+          <p:blipFill>
+            <a:blip r:embed="rId6"/>
+            <a:stretch>
+              <a:fillRect/>
+            </a:stretch>
+          </p:blipFill>
+          <p:spPr>
+            <a:xfrm>
+              <a:off x="104559" y="4731114"/>
+              <a:ext cx="6034298" cy="1644942"/>
+            </a:xfrm>
+            <a:prstGeom prst="rect">
+              <a:avLst/>
+            </a:prstGeom>
+          </p:spPr>
+        </p:pic>
+      </p:grpSp>
+    </p:spTree>
+    <p:extLst>
+      <p:ext uri="{BB962C8B-B14F-4D97-AF65-F5344CB8AC3E}">
+        <p14:creationId xmlns:p14="http://schemas.microsoft.com/office/powerpoint/2010/main" val="343013469"/>
       </p:ext>
     </p:extLst>
   </p:cSld>

</xml_diff>